<commit_message>
Update Core ML PPT
</commit_message>
<xml_diff>
--- a/Swift/CoreMLResearching/CoreML.pptx
+++ b/Swift/CoreMLResearching/CoreML.pptx
@@ -5,7 +5,7 @@
     <p:sldMasterId id="2147483720" r:id="rId1"/>
   </p:sldMasterIdLst>
   <p:notesMasterIdLst>
-    <p:notesMasterId r:id="rId16"/>
+    <p:notesMasterId r:id="rId22"/>
   </p:notesMasterIdLst>
   <p:sldIdLst>
     <p:sldId id="256" r:id="rId2"/>
@@ -17,11 +17,17 @@
     <p:sldId id="263" r:id="rId8"/>
     <p:sldId id="264" r:id="rId9"/>
     <p:sldId id="267" r:id="rId10"/>
-    <p:sldId id="258" r:id="rId11"/>
-    <p:sldId id="259" r:id="rId12"/>
-    <p:sldId id="266" r:id="rId13"/>
-    <p:sldId id="268" r:id="rId14"/>
-    <p:sldId id="269" r:id="rId15"/>
+    <p:sldId id="271" r:id="rId11"/>
+    <p:sldId id="258" r:id="rId12"/>
+    <p:sldId id="259" r:id="rId13"/>
+    <p:sldId id="266" r:id="rId14"/>
+    <p:sldId id="268" r:id="rId15"/>
+    <p:sldId id="272" r:id="rId16"/>
+    <p:sldId id="277" r:id="rId17"/>
+    <p:sldId id="278" r:id="rId18"/>
+    <p:sldId id="279" r:id="rId19"/>
+    <p:sldId id="276" r:id="rId20"/>
+    <p:sldId id="280" r:id="rId21"/>
   </p:sldIdLst>
   <p:sldSz cx="12192000" cy="6858000"/>
   <p:notesSz cx="6858000" cy="9144000"/>
@@ -122,7 +128,13 @@
   </p:defaultTextStyle>
   <p:extLst>
     <p:ext uri="{EFAFB233-063F-42B5-8137-9DF3F51BA10A}">
-      <p15:sldGuideLst xmlns:p15="http://schemas.microsoft.com/office/powerpoint/2012/main"/>
+      <p15:sldGuideLst xmlns:p15="http://schemas.microsoft.com/office/powerpoint/2012/main">
+        <p15:guide id="1" pos="3840" userDrawn="1">
+          <p15:clr>
+            <a:srgbClr val="A4A3A4"/>
+          </p15:clr>
+        </p15:guide>
+      </p15:sldGuideLst>
     </p:ext>
   </p:extLst>
 </p:presentation>
@@ -3410,7 +3422,7 @@
       </p:grpSpPr>
       <p:sp>
         <p:nvSpPr>
-          <p:cNvPr id="5" name="TextBox 4"/>
+          <p:cNvPr id="31" name="TextBox 30"/>
           <p:cNvSpPr txBox="1"/>
           <p:nvPr/>
         </p:nvSpPr>
@@ -3431,22 +3443,10 @@
           <a:lstStyle/>
           <a:p>
             <a:r>
-              <a:rPr lang="en-US" altLang="zh-CN" sz="3000" b="1" dirty="0" smtClean="0">
-                <a:latin typeface="Helvetica Bold" charset="0"/>
-              </a:rPr>
-              <a:t>Core</a:t>
-            </a:r>
-            <a:r>
               <a:rPr lang="zh-CN" altLang="en-US" sz="3000" b="1" dirty="0" smtClean="0">
                 <a:latin typeface="Helvetica Bold" charset="0"/>
               </a:rPr>
-              <a:t> </a:t>
-            </a:r>
-            <a:r>
-              <a:rPr lang="en-US" altLang="zh-CN" sz="3000" b="1" dirty="0" smtClean="0">
-                <a:latin typeface="Helvetica Bold" charset="0"/>
-              </a:rPr>
-              <a:t>ML</a:t>
+              <a:t>模型种类</a:t>
             </a:r>
             <a:endParaRPr lang="en-US" sz="3000" b="1" dirty="0">
               <a:latin typeface="Helvetica Bold" charset="0"/>
@@ -3456,27 +3456,18 @@
       </p:sp>
       <p:sp>
         <p:nvSpPr>
-          <p:cNvPr id="6" name="Rounded Rectangle 5"/>
+          <p:cNvPr id="2" name="Rectangle 1"/>
           <p:cNvSpPr/>
           <p:nvPr/>
         </p:nvSpPr>
         <p:spPr>
           <a:xfrm>
-            <a:off x="2829130" y="1449657"/>
-            <a:ext cx="6579220" cy="869795"/>
-          </a:xfrm>
-          <a:prstGeom prst="roundRect">
-            <a:avLst/>
-          </a:prstGeom>
-          <a:solidFill>
-            <a:schemeClr val="accent4">
-              <a:lumMod val="60000"/>
-              <a:lumOff val="40000"/>
-            </a:schemeClr>
-          </a:solidFill>
-          <a:ln>
-            <a:noFill/>
-          </a:ln>
+            <a:off x="656379" y="2027416"/>
+            <a:ext cx="3440210" cy="1109272"/>
+          </a:xfrm>
+          <a:prstGeom prst="rect">
+            <a:avLst/>
+          </a:prstGeom>
         </p:spPr>
         <p:style>
           <a:lnRef idx="2">
@@ -3500,49 +3491,41 @@
           <a:p>
             <a:pPr algn="ctr"/>
             <a:r>
-              <a:rPr lang="en-US" altLang="zh-CN" dirty="0" smtClean="0">
-                <a:solidFill>
-                  <a:sysClr val="windowText" lastClr="000000"/>
-                </a:solidFill>
-              </a:rPr>
-              <a:t>Your</a:t>
-            </a:r>
-            <a:r>
-              <a:rPr lang="zh-CN" altLang="en-US" dirty="0" smtClean="0">
-                <a:solidFill>
-                  <a:sysClr val="windowText" lastClr="000000"/>
-                </a:solidFill>
-              </a:rPr>
-              <a:t> </a:t>
-            </a:r>
-            <a:r>
-              <a:rPr lang="en-US" altLang="zh-CN" dirty="0" smtClean="0">
-                <a:solidFill>
-                  <a:sysClr val="windowText" lastClr="000000"/>
-                </a:solidFill>
-              </a:rPr>
-              <a:t>APP</a:t>
-            </a:r>
-            <a:endParaRPr lang="en-US" dirty="0">
-              <a:solidFill>
-                <a:sysClr val="windowText" lastClr="000000"/>
-              </a:solidFill>
-            </a:endParaRPr>
-          </a:p>
-        </p:txBody>
-      </p:sp>
-      <p:sp>
-        <p:nvSpPr>
-          <p:cNvPr id="7" name="Rounded Rectangle 6"/>
+              <a:rPr lang="zh-CN" altLang="en-US" dirty="0" smtClean="0"/>
+              <a:t>前馈神经网络</a:t>
+            </a:r>
+            <a:endParaRPr lang="en-US" altLang="zh-CN" dirty="0" smtClean="0"/>
+          </a:p>
+          <a:p>
+            <a:pPr algn="ctr"/>
+            <a:r>
+              <a:rPr lang="en-US" dirty="0" smtClean="0"/>
+              <a:t>Feed </a:t>
+            </a:r>
+            <a:r>
+              <a:rPr lang="en-US" dirty="0"/>
+              <a:t>Forward Neural </a:t>
+            </a:r>
+            <a:r>
+              <a:rPr lang="en-US" dirty="0" smtClean="0"/>
+              <a:t>Networks</a:t>
+            </a:r>
+            <a:endParaRPr lang="en-US" dirty="0"/>
+          </a:p>
+        </p:txBody>
+      </p:sp>
+      <p:sp>
+        <p:nvSpPr>
+          <p:cNvPr id="43" name="Rectangle 42"/>
           <p:cNvSpPr/>
           <p:nvPr/>
         </p:nvSpPr>
         <p:spPr>
           <a:xfrm>
-            <a:off x="2829130" y="2542478"/>
-            <a:ext cx="1408333" cy="780586"/>
-          </a:xfrm>
-          <a:prstGeom prst="roundRect">
+            <a:off x="4401389" y="2027416"/>
+            <a:ext cx="3440210" cy="1109272"/>
+          </a:xfrm>
+          <a:prstGeom prst="rect">
             <a:avLst/>
           </a:prstGeom>
         </p:spPr>
@@ -3568,33 +3551,32 @@
           <a:p>
             <a:pPr algn="ctr"/>
             <a:r>
-              <a:rPr lang="en-US" altLang="zh-CN" dirty="0" smtClean="0">
-                <a:solidFill>
-                  <a:sysClr val="windowText" lastClr="000000"/>
-                </a:solidFill>
-              </a:rPr>
-              <a:t>Vision</a:t>
-            </a:r>
-            <a:endParaRPr lang="en-US" dirty="0">
-              <a:solidFill>
-                <a:sysClr val="windowText" lastClr="000000"/>
-              </a:solidFill>
-            </a:endParaRPr>
-          </a:p>
-        </p:txBody>
-      </p:sp>
-      <p:sp>
-        <p:nvSpPr>
-          <p:cNvPr id="8" name="Rounded Rectangle 7"/>
+              <a:rPr lang="zh-CN" altLang="en-US" dirty="0" smtClean="0"/>
+              <a:t>卷积神经网络</a:t>
+            </a:r>
+            <a:endParaRPr lang="en-US" altLang="zh-CN" dirty="0" smtClean="0"/>
+          </a:p>
+          <a:p>
+            <a:pPr algn="ctr"/>
+            <a:r>
+              <a:rPr lang="en-US" dirty="0"/>
+              <a:t>Convolutional Neural Networks</a:t>
+            </a:r>
+          </a:p>
+        </p:txBody>
+      </p:sp>
+      <p:sp>
+        <p:nvSpPr>
+          <p:cNvPr id="44" name="Rectangle 43"/>
           <p:cNvSpPr/>
           <p:nvPr/>
         </p:nvSpPr>
         <p:spPr>
           <a:xfrm>
-            <a:off x="4438186" y="2542478"/>
-            <a:ext cx="3233854" cy="780586"/>
-          </a:xfrm>
-          <a:prstGeom prst="roundRect">
+            <a:off x="4401389" y="3662195"/>
+            <a:ext cx="3440210" cy="1109272"/>
+          </a:xfrm>
+          <a:prstGeom prst="rect">
             <a:avLst/>
           </a:prstGeom>
         </p:spPr>
@@ -3620,44 +3602,36 @@
           <a:p>
             <a:pPr algn="ctr"/>
             <a:r>
-              <a:rPr lang="en-US" altLang="zh-CN" dirty="0" smtClean="0">
-                <a:solidFill>
-                  <a:sysClr val="windowText" lastClr="000000"/>
-                </a:solidFill>
-              </a:rPr>
-              <a:t>Natural</a:t>
-            </a:r>
-            <a:r>
-              <a:rPr lang="zh-CN" altLang="en-US" dirty="0" smtClean="0">
-                <a:solidFill>
-                  <a:sysClr val="windowText" lastClr="000000"/>
-                </a:solidFill>
-              </a:rPr>
-              <a:t> </a:t>
-            </a:r>
-            <a:r>
-              <a:rPr lang="en-US" altLang="zh-CN" dirty="0" smtClean="0">
-                <a:solidFill>
-                  <a:sysClr val="windowText" lastClr="000000"/>
-                </a:solidFill>
-              </a:rPr>
-              <a:t>language processing</a:t>
-            </a:r>
-          </a:p>
-        </p:txBody>
-      </p:sp>
-      <p:sp>
-        <p:nvSpPr>
-          <p:cNvPr id="9" name="Rounded Rectangle 8"/>
+              <a:rPr lang="zh-CN" altLang="en-US" dirty="0" smtClean="0"/>
+              <a:t>支持向量机</a:t>
+            </a:r>
+            <a:endParaRPr lang="en-US" altLang="zh-CN" dirty="0" smtClean="0"/>
+          </a:p>
+          <a:p>
+            <a:pPr algn="ctr"/>
+            <a:r>
+              <a:rPr lang="en-US" dirty="0" smtClean="0"/>
+              <a:t>Support </a:t>
+            </a:r>
+            <a:r>
+              <a:rPr lang="en-US" dirty="0"/>
+              <a:t>Vector Machines</a:t>
+            </a:r>
+          </a:p>
+        </p:txBody>
+      </p:sp>
+      <p:sp>
+        <p:nvSpPr>
+          <p:cNvPr id="45" name="Rectangle 44"/>
           <p:cNvSpPr/>
           <p:nvPr/>
         </p:nvSpPr>
         <p:spPr>
           <a:xfrm>
-            <a:off x="7872763" y="2542478"/>
-            <a:ext cx="1535589" cy="780586"/>
-          </a:xfrm>
-          <a:prstGeom prst="roundRect">
+            <a:off x="656379" y="3681114"/>
+            <a:ext cx="3440210" cy="1109272"/>
+          </a:xfrm>
+          <a:prstGeom prst="rect">
             <a:avLst/>
           </a:prstGeom>
         </p:spPr>
@@ -3683,33 +3657,36 @@
           <a:p>
             <a:pPr algn="ctr"/>
             <a:r>
-              <a:rPr lang="en-US" dirty="0" err="1" smtClean="0">
-                <a:solidFill>
-                  <a:sysClr val="windowText" lastClr="000000"/>
-                </a:solidFill>
-              </a:rPr>
-              <a:t>GameplayKit</a:t>
-            </a:r>
-            <a:endParaRPr lang="en-US" dirty="0" smtClean="0">
-              <a:solidFill>
-                <a:sysClr val="windowText" lastClr="000000"/>
-              </a:solidFill>
-            </a:endParaRPr>
-          </a:p>
-        </p:txBody>
-      </p:sp>
-      <p:sp>
-        <p:nvSpPr>
-          <p:cNvPr id="10" name="Rounded Rectangle 9"/>
+              <a:rPr lang="zh-CN" altLang="en-US" dirty="0"/>
+              <a:t>集成</a:t>
+            </a:r>
+            <a:r>
+              <a:rPr lang="zh-CN" altLang="en-US" dirty="0" smtClean="0"/>
+              <a:t>树</a:t>
+            </a:r>
+            <a:endParaRPr lang="en-US" altLang="zh-CN" dirty="0" smtClean="0"/>
+          </a:p>
+          <a:p>
+            <a:pPr algn="ctr"/>
+            <a:r>
+              <a:rPr lang="en-US" dirty="0"/>
+              <a:t>Tree Ensembles</a:t>
+            </a:r>
+          </a:p>
+        </p:txBody>
+      </p:sp>
+      <p:sp>
+        <p:nvSpPr>
+          <p:cNvPr id="46" name="Rectangle 45"/>
           <p:cNvSpPr/>
           <p:nvPr/>
         </p:nvSpPr>
         <p:spPr>
           <a:xfrm>
-            <a:off x="2829130" y="3590697"/>
-            <a:ext cx="6579220" cy="780586"/>
-          </a:xfrm>
-          <a:prstGeom prst="roundRect">
+            <a:off x="8146399" y="3662195"/>
+            <a:ext cx="3440210" cy="1109272"/>
+          </a:xfrm>
+          <a:prstGeom prst="rect">
             <a:avLst/>
           </a:prstGeom>
         </p:spPr>
@@ -3735,33 +3712,32 @@
           <a:p>
             <a:pPr algn="ctr"/>
             <a:r>
-              <a:rPr lang="en-US" dirty="0" smtClean="0">
-                <a:solidFill>
-                  <a:sysClr val="windowText" lastClr="000000"/>
-                </a:solidFill>
-              </a:rPr>
-              <a:t>Core ML</a:t>
-            </a:r>
-            <a:endParaRPr lang="en-US" dirty="0">
-              <a:solidFill>
-                <a:sysClr val="windowText" lastClr="000000"/>
-              </a:solidFill>
-            </a:endParaRPr>
-          </a:p>
-        </p:txBody>
-      </p:sp>
-      <p:sp>
-        <p:nvSpPr>
-          <p:cNvPr id="11" name="Rounded Rectangle 10"/>
+              <a:rPr lang="zh-CN" altLang="en-US" dirty="0" smtClean="0"/>
+              <a:t>广义线性模型</a:t>
+            </a:r>
+            <a:endParaRPr lang="en-US" altLang="zh-CN" dirty="0" smtClean="0"/>
+          </a:p>
+          <a:p>
+            <a:pPr algn="ctr"/>
+            <a:r>
+              <a:rPr lang="en-US" dirty="0"/>
+              <a:t>Generalized Linear Models</a:t>
+            </a:r>
+          </a:p>
+        </p:txBody>
+      </p:sp>
+      <p:sp>
+        <p:nvSpPr>
+          <p:cNvPr id="47" name="Rectangle 46"/>
           <p:cNvSpPr/>
           <p:nvPr/>
         </p:nvSpPr>
         <p:spPr>
           <a:xfrm>
-            <a:off x="2829130" y="4627772"/>
-            <a:ext cx="2810107" cy="780586"/>
-          </a:xfrm>
-          <a:prstGeom prst="roundRect">
+            <a:off x="8146399" y="2027416"/>
+            <a:ext cx="3440210" cy="1109272"/>
+          </a:xfrm>
+          <a:prstGeom prst="rect">
             <a:avLst/>
           </a:prstGeom>
         </p:spPr>
@@ -3787,85 +3763,24 @@
           <a:p>
             <a:pPr algn="ctr"/>
             <a:r>
-              <a:rPr lang="en-US" dirty="0" smtClean="0">
-                <a:solidFill>
-                  <a:sysClr val="windowText" lastClr="000000"/>
-                </a:solidFill>
-              </a:rPr>
-              <a:t>Accelerate BNNS</a:t>
-            </a:r>
-            <a:endParaRPr lang="en-US" dirty="0">
-              <a:solidFill>
-                <a:sysClr val="windowText" lastClr="000000"/>
-              </a:solidFill>
-            </a:endParaRPr>
-          </a:p>
-        </p:txBody>
-      </p:sp>
-      <p:sp>
-        <p:nvSpPr>
-          <p:cNvPr id="12" name="Rounded Rectangle 11"/>
-          <p:cNvSpPr/>
-          <p:nvPr/>
-        </p:nvSpPr>
-        <p:spPr>
-          <a:xfrm>
-            <a:off x="5820937" y="4638916"/>
-            <a:ext cx="3587413" cy="780586"/>
-          </a:xfrm>
-          <a:prstGeom prst="roundRect">
-            <a:avLst/>
-          </a:prstGeom>
-        </p:spPr>
-        <p:style>
-          <a:lnRef idx="2">
-            <a:schemeClr val="accent1">
-              <a:shade val="50000"/>
-            </a:schemeClr>
-          </a:lnRef>
-          <a:fillRef idx="1">
-            <a:schemeClr val="accent1"/>
-          </a:fillRef>
-          <a:effectRef idx="0">
-            <a:schemeClr val="accent1"/>
-          </a:effectRef>
-          <a:fontRef idx="minor">
-            <a:schemeClr val="lt1"/>
-          </a:fontRef>
-        </p:style>
-        <p:txBody>
-          <a:bodyPr rtlCol="0" anchor="ctr"/>
-          <a:lstStyle/>
+              <a:rPr lang="zh-CN" altLang="en-US" dirty="0" smtClean="0"/>
+              <a:t>循环神经网络</a:t>
+            </a:r>
+            <a:endParaRPr lang="en-US" altLang="zh-CN" dirty="0" smtClean="0"/>
+          </a:p>
           <a:p>
             <a:pPr algn="ctr"/>
             <a:r>
-              <a:rPr lang="en-US" dirty="0" smtClean="0">
-                <a:solidFill>
-                  <a:sysClr val="windowText" lastClr="000000"/>
-                </a:solidFill>
-              </a:rPr>
-              <a:t>Metal Performance </a:t>
-            </a:r>
-            <a:r>
-              <a:rPr lang="en-US" dirty="0" err="1" smtClean="0">
-                <a:solidFill>
-                  <a:sysClr val="windowText" lastClr="000000"/>
-                </a:solidFill>
-              </a:rPr>
-              <a:t>Shaders</a:t>
-            </a:r>
-            <a:endParaRPr lang="en-US" dirty="0">
-              <a:solidFill>
-                <a:sysClr val="windowText" lastClr="000000"/>
-              </a:solidFill>
-            </a:endParaRPr>
+              <a:rPr lang="en-US" dirty="0"/>
+              <a:t>Recurrent Neural Networks</a:t>
+            </a:r>
           </a:p>
         </p:txBody>
       </p:sp>
     </p:spTree>
     <p:extLst>
       <p:ext uri="{BB962C8B-B14F-4D97-AF65-F5344CB8AC3E}">
-        <p14:creationId xmlns:p14="http://schemas.microsoft.com/office/powerpoint/2010/main" val="528303943"/>
+        <p14:creationId xmlns:p14="http://schemas.microsoft.com/office/powerpoint/2010/main" val="1188184246"/>
       </p:ext>
     </p:extLst>
   </p:cSld>
@@ -3907,219 +3822,6 @@
         </p:nvSpPr>
         <p:spPr>
           <a:xfrm>
-            <a:off x="2249201" y="1182504"/>
-            <a:ext cx="2857500" cy="4524315"/>
-          </a:xfrm>
-          <a:prstGeom prst="rect">
-            <a:avLst/>
-          </a:prstGeom>
-          <a:noFill/>
-        </p:spPr>
-        <p:txBody>
-          <a:bodyPr wrap="square" rtlCol="0">
-            <a:spAutoFit/>
-          </a:bodyPr>
-          <a:lstStyle/>
-          <a:p>
-            <a:r>
-              <a:rPr lang="en-US" sz="3000" dirty="0" smtClean="0"/>
-              <a:t>Vision:</a:t>
-            </a:r>
-          </a:p>
-          <a:p>
-            <a:pPr marL="285750" indent="-285750">
-              <a:buFont typeface="Arial" charset="0"/>
-              <a:buChar char="•"/>
-            </a:pPr>
-            <a:r>
-              <a:rPr lang="zh-CN" altLang="en-US" sz="3000" dirty="0" smtClean="0"/>
-              <a:t>面部追踪</a:t>
-            </a:r>
-            <a:endParaRPr lang="en-US" altLang="zh-CN" sz="3000" dirty="0" smtClean="0"/>
-          </a:p>
-          <a:p>
-            <a:pPr marL="285750" indent="-285750">
-              <a:buFont typeface="Arial" charset="0"/>
-              <a:buChar char="•"/>
-            </a:pPr>
-            <a:r>
-              <a:rPr lang="zh-CN" altLang="en-US" sz="3000" dirty="0" smtClean="0"/>
-              <a:t>面部识别</a:t>
-            </a:r>
-            <a:endParaRPr lang="en-US" altLang="zh-CN" sz="3000" dirty="0" smtClean="0"/>
-          </a:p>
-          <a:p>
-            <a:pPr marL="285750" indent="-285750">
-              <a:buFont typeface="Arial" charset="0"/>
-              <a:buChar char="•"/>
-            </a:pPr>
-            <a:r>
-              <a:rPr lang="zh-CN" altLang="en-US" sz="3000" dirty="0" smtClean="0"/>
-              <a:t>地标</a:t>
-            </a:r>
-            <a:endParaRPr lang="en-US" altLang="zh-CN" sz="3000" dirty="0" smtClean="0"/>
-          </a:p>
-          <a:p>
-            <a:pPr marL="285750" indent="-285750">
-              <a:buFont typeface="Arial" charset="0"/>
-              <a:buChar char="•"/>
-            </a:pPr>
-            <a:r>
-              <a:rPr lang="zh-CN" altLang="en-US" sz="3000" dirty="0" smtClean="0"/>
-              <a:t>文本识别</a:t>
-            </a:r>
-            <a:endParaRPr lang="en-US" altLang="zh-CN" sz="3000" dirty="0" smtClean="0"/>
-          </a:p>
-          <a:p>
-            <a:pPr marL="285750" indent="-285750">
-              <a:buFont typeface="Arial" charset="0"/>
-              <a:buChar char="•"/>
-            </a:pPr>
-            <a:r>
-              <a:rPr lang="zh-CN" altLang="en-US" sz="3000" dirty="0" smtClean="0"/>
-              <a:t>正方形识别</a:t>
-            </a:r>
-            <a:endParaRPr lang="en-US" altLang="zh-CN" sz="3000" dirty="0" smtClean="0"/>
-          </a:p>
-          <a:p>
-            <a:pPr marL="285750" indent="-285750">
-              <a:buFont typeface="Arial" charset="0"/>
-              <a:buChar char="•"/>
-            </a:pPr>
-            <a:r>
-              <a:rPr lang="zh-CN" altLang="en-US" sz="3000" dirty="0" smtClean="0"/>
-              <a:t>条码识别</a:t>
-            </a:r>
-            <a:endParaRPr lang="en-US" altLang="zh-CN" sz="3000" dirty="0" smtClean="0"/>
-          </a:p>
-          <a:p>
-            <a:pPr marL="285750" indent="-285750">
-              <a:buFont typeface="Arial" charset="0"/>
-              <a:buChar char="•"/>
-            </a:pPr>
-            <a:r>
-              <a:rPr lang="zh-CN" altLang="en-US" sz="3000" dirty="0" smtClean="0"/>
-              <a:t>物体追踪</a:t>
-            </a:r>
-            <a:endParaRPr lang="en-US" altLang="zh-CN" sz="3000" dirty="0" smtClean="0"/>
-          </a:p>
-          <a:p>
-            <a:pPr marL="285750" indent="-285750">
-              <a:buFont typeface="Arial" charset="0"/>
-              <a:buChar char="•"/>
-            </a:pPr>
-            <a:r>
-              <a:rPr lang="zh-CN" altLang="en-US" sz="3000" dirty="0" smtClean="0"/>
-              <a:t>图像匹配</a:t>
-            </a:r>
-            <a:endParaRPr lang="en-US" altLang="zh-CN" sz="3000" dirty="0" smtClean="0"/>
-          </a:p>
-          <a:p>
-            <a:pPr marL="285750" indent="-285750">
-              <a:buFont typeface="Arial" charset="0"/>
-              <a:buChar char="•"/>
-            </a:pPr>
-            <a:endParaRPr lang="en-US" dirty="0" smtClean="0"/>
-          </a:p>
-        </p:txBody>
-      </p:sp>
-      <p:sp>
-        <p:nvSpPr>
-          <p:cNvPr id="6" name="TextBox 5"/>
-          <p:cNvSpPr txBox="1"/>
-          <p:nvPr/>
-        </p:nvSpPr>
-        <p:spPr>
-          <a:xfrm>
-            <a:off x="7093912" y="1182504"/>
-            <a:ext cx="3291840" cy="2862322"/>
-          </a:xfrm>
-          <a:prstGeom prst="rect">
-            <a:avLst/>
-          </a:prstGeom>
-          <a:noFill/>
-        </p:spPr>
-        <p:txBody>
-          <a:bodyPr wrap="square" rtlCol="0">
-            <a:spAutoFit/>
-          </a:bodyPr>
-          <a:lstStyle/>
-          <a:p>
-            <a:r>
-              <a:rPr lang="en-US" altLang="zh-CN" sz="3000" dirty="0" smtClean="0"/>
-              <a:t>NLP</a:t>
-            </a:r>
-            <a:r>
-              <a:rPr lang="zh-CN" altLang="en-US" sz="3000" dirty="0" smtClean="0"/>
-              <a:t>：</a:t>
-            </a:r>
-            <a:endParaRPr lang="en-US" altLang="zh-CN" sz="3000" dirty="0" smtClean="0"/>
-          </a:p>
-          <a:p>
-            <a:pPr marL="285750" indent="-285750">
-              <a:buFont typeface="Arial" charset="0"/>
-              <a:buChar char="•"/>
-            </a:pPr>
-            <a:r>
-              <a:rPr lang="zh-CN" altLang="en-US" sz="3000" dirty="0" smtClean="0"/>
-              <a:t>语言检测</a:t>
-            </a:r>
-            <a:endParaRPr lang="en-US" altLang="zh-CN" sz="3000" dirty="0" smtClean="0"/>
-          </a:p>
-          <a:p>
-            <a:pPr marL="285750" indent="-285750">
-              <a:buFont typeface="Arial" charset="0"/>
-              <a:buChar char="•"/>
-            </a:pPr>
-            <a:r>
-              <a:rPr lang="zh-CN" altLang="en-US" sz="3000" dirty="0" smtClean="0"/>
-              <a:t>符号化识别</a:t>
-            </a:r>
-            <a:endParaRPr lang="en-US" altLang="zh-CN" sz="3000" dirty="0" smtClean="0"/>
-          </a:p>
-          <a:p>
-            <a:pPr marL="285750" indent="-285750">
-              <a:buFont typeface="Arial" charset="0"/>
-              <a:buChar char="•"/>
-            </a:pPr>
-            <a:r>
-              <a:rPr lang="zh-CN" altLang="en-US" sz="3000" dirty="0" smtClean="0"/>
-              <a:t>词形还原</a:t>
-            </a:r>
-            <a:endParaRPr lang="en-US" altLang="zh-CN" sz="3000" dirty="0" smtClean="0"/>
-          </a:p>
-          <a:p>
-            <a:pPr marL="285750" indent="-285750">
-              <a:buFont typeface="Arial" charset="0"/>
-              <a:buChar char="•"/>
-            </a:pPr>
-            <a:r>
-              <a:rPr lang="zh-CN" altLang="en-US" sz="3000" dirty="0" smtClean="0"/>
-              <a:t>对话分段</a:t>
-            </a:r>
-            <a:endParaRPr lang="en-US" altLang="zh-CN" sz="3000" dirty="0" smtClean="0"/>
-          </a:p>
-          <a:p>
-            <a:pPr marL="285750" indent="-285750">
-              <a:buFont typeface="Arial" charset="0"/>
-              <a:buChar char="•"/>
-            </a:pPr>
-            <a:r>
-              <a:rPr lang="zh-CN" altLang="en-US" sz="3000" dirty="0" smtClean="0"/>
-              <a:t>实体名称识别</a:t>
-            </a:r>
-            <a:endParaRPr lang="en-US" sz="3000" dirty="0"/>
-          </a:p>
-        </p:txBody>
-      </p:sp>
-      <p:sp>
-        <p:nvSpPr>
-          <p:cNvPr id="7" name="TextBox 6"/>
-          <p:cNvSpPr txBox="1"/>
-          <p:nvPr/>
-        </p:nvSpPr>
-        <p:spPr>
-          <a:xfrm>
             <a:off x="540000" y="540000"/>
             <a:ext cx="1723549" cy="553998"/>
           </a:xfrm>
@@ -4158,10 +3860,418 @@
           </a:p>
         </p:txBody>
       </p:sp>
+      <p:sp>
+        <p:nvSpPr>
+          <p:cNvPr id="6" name="Rounded Rectangle 5"/>
+          <p:cNvSpPr/>
+          <p:nvPr/>
+        </p:nvSpPr>
+        <p:spPr>
+          <a:xfrm>
+            <a:off x="2829130" y="1449657"/>
+            <a:ext cx="6579220" cy="869795"/>
+          </a:xfrm>
+          <a:prstGeom prst="roundRect">
+            <a:avLst/>
+          </a:prstGeom>
+          <a:solidFill>
+            <a:schemeClr val="accent4">
+              <a:lumMod val="60000"/>
+              <a:lumOff val="40000"/>
+            </a:schemeClr>
+          </a:solidFill>
+          <a:ln>
+            <a:noFill/>
+          </a:ln>
+        </p:spPr>
+        <p:style>
+          <a:lnRef idx="2">
+            <a:schemeClr val="accent1">
+              <a:shade val="50000"/>
+            </a:schemeClr>
+          </a:lnRef>
+          <a:fillRef idx="1">
+            <a:schemeClr val="accent1"/>
+          </a:fillRef>
+          <a:effectRef idx="0">
+            <a:schemeClr val="accent1"/>
+          </a:effectRef>
+          <a:fontRef idx="minor">
+            <a:schemeClr val="lt1"/>
+          </a:fontRef>
+        </p:style>
+        <p:txBody>
+          <a:bodyPr rtlCol="0" anchor="ctr"/>
+          <a:lstStyle/>
+          <a:p>
+            <a:pPr algn="ctr"/>
+            <a:r>
+              <a:rPr lang="en-US" altLang="zh-CN" dirty="0" smtClean="0">
+                <a:solidFill>
+                  <a:sysClr val="windowText" lastClr="000000"/>
+                </a:solidFill>
+              </a:rPr>
+              <a:t>Your</a:t>
+            </a:r>
+            <a:r>
+              <a:rPr lang="zh-CN" altLang="en-US" dirty="0" smtClean="0">
+                <a:solidFill>
+                  <a:sysClr val="windowText" lastClr="000000"/>
+                </a:solidFill>
+              </a:rPr>
+              <a:t> </a:t>
+            </a:r>
+            <a:r>
+              <a:rPr lang="en-US" altLang="zh-CN" dirty="0" smtClean="0">
+                <a:solidFill>
+                  <a:sysClr val="windowText" lastClr="000000"/>
+                </a:solidFill>
+              </a:rPr>
+              <a:t>APP</a:t>
+            </a:r>
+            <a:endParaRPr lang="en-US" dirty="0">
+              <a:solidFill>
+                <a:sysClr val="windowText" lastClr="000000"/>
+              </a:solidFill>
+            </a:endParaRPr>
+          </a:p>
+        </p:txBody>
+      </p:sp>
+      <p:sp>
+        <p:nvSpPr>
+          <p:cNvPr id="7" name="Rounded Rectangle 6"/>
+          <p:cNvSpPr/>
+          <p:nvPr/>
+        </p:nvSpPr>
+        <p:spPr>
+          <a:xfrm>
+            <a:off x="2829130" y="2542478"/>
+            <a:ext cx="1408333" cy="780586"/>
+          </a:xfrm>
+          <a:prstGeom prst="roundRect">
+            <a:avLst/>
+          </a:prstGeom>
+        </p:spPr>
+        <p:style>
+          <a:lnRef idx="2">
+            <a:schemeClr val="accent1">
+              <a:shade val="50000"/>
+            </a:schemeClr>
+          </a:lnRef>
+          <a:fillRef idx="1">
+            <a:schemeClr val="accent1"/>
+          </a:fillRef>
+          <a:effectRef idx="0">
+            <a:schemeClr val="accent1"/>
+          </a:effectRef>
+          <a:fontRef idx="minor">
+            <a:schemeClr val="lt1"/>
+          </a:fontRef>
+        </p:style>
+        <p:txBody>
+          <a:bodyPr rtlCol="0" anchor="ctr"/>
+          <a:lstStyle/>
+          <a:p>
+            <a:pPr algn="ctr"/>
+            <a:r>
+              <a:rPr lang="en-US" altLang="zh-CN" dirty="0" smtClean="0">
+                <a:solidFill>
+                  <a:sysClr val="windowText" lastClr="000000"/>
+                </a:solidFill>
+              </a:rPr>
+              <a:t>Vision</a:t>
+            </a:r>
+            <a:endParaRPr lang="en-US" dirty="0">
+              <a:solidFill>
+                <a:sysClr val="windowText" lastClr="000000"/>
+              </a:solidFill>
+            </a:endParaRPr>
+          </a:p>
+        </p:txBody>
+      </p:sp>
+      <p:sp>
+        <p:nvSpPr>
+          <p:cNvPr id="8" name="Rounded Rectangle 7"/>
+          <p:cNvSpPr/>
+          <p:nvPr/>
+        </p:nvSpPr>
+        <p:spPr>
+          <a:xfrm>
+            <a:off x="4438186" y="2542478"/>
+            <a:ext cx="3233854" cy="780586"/>
+          </a:xfrm>
+          <a:prstGeom prst="roundRect">
+            <a:avLst/>
+          </a:prstGeom>
+        </p:spPr>
+        <p:style>
+          <a:lnRef idx="2">
+            <a:schemeClr val="accent1">
+              <a:shade val="50000"/>
+            </a:schemeClr>
+          </a:lnRef>
+          <a:fillRef idx="1">
+            <a:schemeClr val="accent1"/>
+          </a:fillRef>
+          <a:effectRef idx="0">
+            <a:schemeClr val="accent1"/>
+          </a:effectRef>
+          <a:fontRef idx="minor">
+            <a:schemeClr val="lt1"/>
+          </a:fontRef>
+        </p:style>
+        <p:txBody>
+          <a:bodyPr rtlCol="0" anchor="ctr"/>
+          <a:lstStyle/>
+          <a:p>
+            <a:pPr algn="ctr"/>
+            <a:r>
+              <a:rPr lang="en-US" altLang="zh-CN" dirty="0" smtClean="0">
+                <a:solidFill>
+                  <a:sysClr val="windowText" lastClr="000000"/>
+                </a:solidFill>
+              </a:rPr>
+              <a:t>Natural</a:t>
+            </a:r>
+            <a:r>
+              <a:rPr lang="zh-CN" altLang="en-US" dirty="0" smtClean="0">
+                <a:solidFill>
+                  <a:sysClr val="windowText" lastClr="000000"/>
+                </a:solidFill>
+              </a:rPr>
+              <a:t> </a:t>
+            </a:r>
+            <a:r>
+              <a:rPr lang="en-US" altLang="zh-CN" dirty="0" smtClean="0">
+                <a:solidFill>
+                  <a:sysClr val="windowText" lastClr="000000"/>
+                </a:solidFill>
+              </a:rPr>
+              <a:t>language processing</a:t>
+            </a:r>
+          </a:p>
+        </p:txBody>
+      </p:sp>
+      <p:sp>
+        <p:nvSpPr>
+          <p:cNvPr id="9" name="Rounded Rectangle 8"/>
+          <p:cNvSpPr/>
+          <p:nvPr/>
+        </p:nvSpPr>
+        <p:spPr>
+          <a:xfrm>
+            <a:off x="7872763" y="2542478"/>
+            <a:ext cx="1535589" cy="780586"/>
+          </a:xfrm>
+          <a:prstGeom prst="roundRect">
+            <a:avLst/>
+          </a:prstGeom>
+        </p:spPr>
+        <p:style>
+          <a:lnRef idx="2">
+            <a:schemeClr val="accent1">
+              <a:shade val="50000"/>
+            </a:schemeClr>
+          </a:lnRef>
+          <a:fillRef idx="1">
+            <a:schemeClr val="accent1"/>
+          </a:fillRef>
+          <a:effectRef idx="0">
+            <a:schemeClr val="accent1"/>
+          </a:effectRef>
+          <a:fontRef idx="minor">
+            <a:schemeClr val="lt1"/>
+          </a:fontRef>
+        </p:style>
+        <p:txBody>
+          <a:bodyPr rtlCol="0" anchor="ctr"/>
+          <a:lstStyle/>
+          <a:p>
+            <a:pPr algn="ctr"/>
+            <a:r>
+              <a:rPr lang="en-US" dirty="0" err="1" smtClean="0">
+                <a:solidFill>
+                  <a:sysClr val="windowText" lastClr="000000"/>
+                </a:solidFill>
+              </a:rPr>
+              <a:t>GameplayKit</a:t>
+            </a:r>
+            <a:endParaRPr lang="en-US" dirty="0" smtClean="0">
+              <a:solidFill>
+                <a:sysClr val="windowText" lastClr="000000"/>
+              </a:solidFill>
+            </a:endParaRPr>
+          </a:p>
+        </p:txBody>
+      </p:sp>
+      <p:sp>
+        <p:nvSpPr>
+          <p:cNvPr id="10" name="Rounded Rectangle 9"/>
+          <p:cNvSpPr/>
+          <p:nvPr/>
+        </p:nvSpPr>
+        <p:spPr>
+          <a:xfrm>
+            <a:off x="2829130" y="3590697"/>
+            <a:ext cx="6579220" cy="780586"/>
+          </a:xfrm>
+          <a:prstGeom prst="roundRect">
+            <a:avLst/>
+          </a:prstGeom>
+        </p:spPr>
+        <p:style>
+          <a:lnRef idx="2">
+            <a:schemeClr val="accent1">
+              <a:shade val="50000"/>
+            </a:schemeClr>
+          </a:lnRef>
+          <a:fillRef idx="1">
+            <a:schemeClr val="accent1"/>
+          </a:fillRef>
+          <a:effectRef idx="0">
+            <a:schemeClr val="accent1"/>
+          </a:effectRef>
+          <a:fontRef idx="minor">
+            <a:schemeClr val="lt1"/>
+          </a:fontRef>
+        </p:style>
+        <p:txBody>
+          <a:bodyPr rtlCol="0" anchor="ctr"/>
+          <a:lstStyle/>
+          <a:p>
+            <a:pPr algn="ctr"/>
+            <a:r>
+              <a:rPr lang="en-US" dirty="0" smtClean="0">
+                <a:solidFill>
+                  <a:sysClr val="windowText" lastClr="000000"/>
+                </a:solidFill>
+              </a:rPr>
+              <a:t>Core ML</a:t>
+            </a:r>
+            <a:endParaRPr lang="en-US" dirty="0">
+              <a:solidFill>
+                <a:sysClr val="windowText" lastClr="000000"/>
+              </a:solidFill>
+            </a:endParaRPr>
+          </a:p>
+        </p:txBody>
+      </p:sp>
+      <p:sp>
+        <p:nvSpPr>
+          <p:cNvPr id="11" name="Rounded Rectangle 10"/>
+          <p:cNvSpPr/>
+          <p:nvPr/>
+        </p:nvSpPr>
+        <p:spPr>
+          <a:xfrm>
+            <a:off x="2829130" y="4627772"/>
+            <a:ext cx="2810107" cy="780586"/>
+          </a:xfrm>
+          <a:prstGeom prst="roundRect">
+            <a:avLst/>
+          </a:prstGeom>
+        </p:spPr>
+        <p:style>
+          <a:lnRef idx="2">
+            <a:schemeClr val="accent1">
+              <a:shade val="50000"/>
+            </a:schemeClr>
+          </a:lnRef>
+          <a:fillRef idx="1">
+            <a:schemeClr val="accent1"/>
+          </a:fillRef>
+          <a:effectRef idx="0">
+            <a:schemeClr val="accent1"/>
+          </a:effectRef>
+          <a:fontRef idx="minor">
+            <a:schemeClr val="lt1"/>
+          </a:fontRef>
+        </p:style>
+        <p:txBody>
+          <a:bodyPr rtlCol="0" anchor="ctr"/>
+          <a:lstStyle/>
+          <a:p>
+            <a:pPr algn="ctr"/>
+            <a:r>
+              <a:rPr lang="en-US" dirty="0" smtClean="0">
+                <a:solidFill>
+                  <a:sysClr val="windowText" lastClr="000000"/>
+                </a:solidFill>
+              </a:rPr>
+              <a:t>Accelerate BNNS</a:t>
+            </a:r>
+            <a:endParaRPr lang="en-US" dirty="0">
+              <a:solidFill>
+                <a:sysClr val="windowText" lastClr="000000"/>
+              </a:solidFill>
+            </a:endParaRPr>
+          </a:p>
+        </p:txBody>
+      </p:sp>
+      <p:sp>
+        <p:nvSpPr>
+          <p:cNvPr id="12" name="Rounded Rectangle 11"/>
+          <p:cNvSpPr/>
+          <p:nvPr/>
+        </p:nvSpPr>
+        <p:spPr>
+          <a:xfrm>
+            <a:off x="5820937" y="4638916"/>
+            <a:ext cx="3587413" cy="780586"/>
+          </a:xfrm>
+          <a:prstGeom prst="roundRect">
+            <a:avLst/>
+          </a:prstGeom>
+        </p:spPr>
+        <p:style>
+          <a:lnRef idx="2">
+            <a:schemeClr val="accent1">
+              <a:shade val="50000"/>
+            </a:schemeClr>
+          </a:lnRef>
+          <a:fillRef idx="1">
+            <a:schemeClr val="accent1"/>
+          </a:fillRef>
+          <a:effectRef idx="0">
+            <a:schemeClr val="accent1"/>
+          </a:effectRef>
+          <a:fontRef idx="minor">
+            <a:schemeClr val="lt1"/>
+          </a:fontRef>
+        </p:style>
+        <p:txBody>
+          <a:bodyPr rtlCol="0" anchor="ctr"/>
+          <a:lstStyle/>
+          <a:p>
+            <a:pPr algn="ctr"/>
+            <a:r>
+              <a:rPr lang="en-US" dirty="0" smtClean="0">
+                <a:solidFill>
+                  <a:sysClr val="windowText" lastClr="000000"/>
+                </a:solidFill>
+              </a:rPr>
+              <a:t>Metal Performance </a:t>
+            </a:r>
+            <a:r>
+              <a:rPr lang="en-US" dirty="0" err="1" smtClean="0">
+                <a:solidFill>
+                  <a:sysClr val="windowText" lastClr="000000"/>
+                </a:solidFill>
+              </a:rPr>
+              <a:t>Shaders</a:t>
+            </a:r>
+            <a:endParaRPr lang="en-US" dirty="0">
+              <a:solidFill>
+                <a:sysClr val="windowText" lastClr="000000"/>
+              </a:solidFill>
+            </a:endParaRPr>
+          </a:p>
+        </p:txBody>
+      </p:sp>
     </p:spTree>
     <p:extLst>
       <p:ext uri="{BB962C8B-B14F-4D97-AF65-F5344CB8AC3E}">
-        <p14:creationId xmlns:p14="http://schemas.microsoft.com/office/powerpoint/2010/main" val="1531837236"/>
+        <p14:creationId xmlns:p14="http://schemas.microsoft.com/office/powerpoint/2010/main" val="528303943"/>
       </p:ext>
     </p:extLst>
   </p:cSld>
@@ -4197,14 +4307,227 @@
       </p:grpSpPr>
       <p:sp>
         <p:nvSpPr>
-          <p:cNvPr id="2" name="TextBox 1"/>
+          <p:cNvPr id="5" name="TextBox 4"/>
           <p:cNvSpPr txBox="1"/>
           <p:nvPr/>
         </p:nvSpPr>
         <p:spPr>
           <a:xfrm>
+            <a:off x="2249201" y="1182504"/>
+            <a:ext cx="2857500" cy="4524315"/>
+          </a:xfrm>
+          <a:prstGeom prst="rect">
+            <a:avLst/>
+          </a:prstGeom>
+          <a:noFill/>
+        </p:spPr>
+        <p:txBody>
+          <a:bodyPr wrap="square" rtlCol="0">
+            <a:spAutoFit/>
+          </a:bodyPr>
+          <a:lstStyle/>
+          <a:p>
+            <a:r>
+              <a:rPr lang="en-US" sz="3000" dirty="0" smtClean="0"/>
+              <a:t>Vision:</a:t>
+            </a:r>
+          </a:p>
+          <a:p>
+            <a:pPr marL="285750" indent="-285750">
+              <a:buFont typeface="Arial" charset="0"/>
+              <a:buChar char="•"/>
+            </a:pPr>
+            <a:r>
+              <a:rPr lang="zh-CN" altLang="en-US" sz="3000" dirty="0" smtClean="0"/>
+              <a:t>面部追踪</a:t>
+            </a:r>
+            <a:endParaRPr lang="en-US" altLang="zh-CN" sz="3000" dirty="0" smtClean="0"/>
+          </a:p>
+          <a:p>
+            <a:pPr marL="285750" indent="-285750">
+              <a:buFont typeface="Arial" charset="0"/>
+              <a:buChar char="•"/>
+            </a:pPr>
+            <a:r>
+              <a:rPr lang="zh-CN" altLang="en-US" sz="3000" dirty="0" smtClean="0"/>
+              <a:t>面部识别</a:t>
+            </a:r>
+            <a:endParaRPr lang="en-US" altLang="zh-CN" sz="3000" dirty="0" smtClean="0"/>
+          </a:p>
+          <a:p>
+            <a:pPr marL="285750" indent="-285750">
+              <a:buFont typeface="Arial" charset="0"/>
+              <a:buChar char="•"/>
+            </a:pPr>
+            <a:r>
+              <a:rPr lang="zh-CN" altLang="en-US" sz="3000" dirty="0" smtClean="0"/>
+              <a:t>地标</a:t>
+            </a:r>
+            <a:endParaRPr lang="en-US" altLang="zh-CN" sz="3000" dirty="0" smtClean="0"/>
+          </a:p>
+          <a:p>
+            <a:pPr marL="285750" indent="-285750">
+              <a:buFont typeface="Arial" charset="0"/>
+              <a:buChar char="•"/>
+            </a:pPr>
+            <a:r>
+              <a:rPr lang="zh-CN" altLang="en-US" sz="3000" dirty="0" smtClean="0"/>
+              <a:t>文本识别</a:t>
+            </a:r>
+            <a:endParaRPr lang="en-US" altLang="zh-CN" sz="3000" dirty="0" smtClean="0"/>
+          </a:p>
+          <a:p>
+            <a:pPr marL="285750" indent="-285750">
+              <a:buFont typeface="Arial" charset="0"/>
+              <a:buChar char="•"/>
+            </a:pPr>
+            <a:r>
+              <a:rPr lang="zh-CN" altLang="en-US" sz="3000" dirty="0" smtClean="0"/>
+              <a:t>正方形识别</a:t>
+            </a:r>
+            <a:endParaRPr lang="en-US" altLang="zh-CN" sz="3000" dirty="0" smtClean="0"/>
+          </a:p>
+          <a:p>
+            <a:pPr marL="285750" indent="-285750">
+              <a:buFont typeface="Arial" charset="0"/>
+              <a:buChar char="•"/>
+            </a:pPr>
+            <a:r>
+              <a:rPr lang="zh-CN" altLang="en-US" sz="3000" dirty="0" smtClean="0"/>
+              <a:t>条码识别</a:t>
+            </a:r>
+            <a:endParaRPr lang="en-US" altLang="zh-CN" sz="3000" dirty="0" smtClean="0"/>
+          </a:p>
+          <a:p>
+            <a:pPr marL="285750" indent="-285750">
+              <a:buFont typeface="Arial" charset="0"/>
+              <a:buChar char="•"/>
+            </a:pPr>
+            <a:r>
+              <a:rPr lang="zh-CN" altLang="en-US" sz="3000" dirty="0" smtClean="0"/>
+              <a:t>物体追踪</a:t>
+            </a:r>
+            <a:endParaRPr lang="en-US" altLang="zh-CN" sz="3000" dirty="0" smtClean="0"/>
+          </a:p>
+          <a:p>
+            <a:pPr marL="285750" indent="-285750">
+              <a:buFont typeface="Arial" charset="0"/>
+              <a:buChar char="•"/>
+            </a:pPr>
+            <a:r>
+              <a:rPr lang="zh-CN" altLang="en-US" sz="3000" dirty="0" smtClean="0"/>
+              <a:t>图像匹配</a:t>
+            </a:r>
+            <a:endParaRPr lang="en-US" altLang="zh-CN" sz="3000" dirty="0" smtClean="0"/>
+          </a:p>
+          <a:p>
+            <a:pPr marL="285750" indent="-285750">
+              <a:buFont typeface="Arial" charset="0"/>
+              <a:buChar char="•"/>
+            </a:pPr>
+            <a:endParaRPr lang="en-US" dirty="0" smtClean="0"/>
+          </a:p>
+        </p:txBody>
+      </p:sp>
+      <p:sp>
+        <p:nvSpPr>
+          <p:cNvPr id="6" name="TextBox 5"/>
+          <p:cNvSpPr txBox="1"/>
+          <p:nvPr/>
+        </p:nvSpPr>
+        <p:spPr>
+          <a:xfrm>
+            <a:off x="7093912" y="1182504"/>
+            <a:ext cx="3291840" cy="2862322"/>
+          </a:xfrm>
+          <a:prstGeom prst="rect">
+            <a:avLst/>
+          </a:prstGeom>
+          <a:noFill/>
+        </p:spPr>
+        <p:txBody>
+          <a:bodyPr wrap="square" rtlCol="0">
+            <a:spAutoFit/>
+          </a:bodyPr>
+          <a:lstStyle/>
+          <a:p>
+            <a:r>
+              <a:rPr lang="en-US" altLang="zh-CN" sz="3000" dirty="0" smtClean="0"/>
+              <a:t>NLP</a:t>
+            </a:r>
+            <a:r>
+              <a:rPr lang="zh-CN" altLang="en-US" sz="3000" dirty="0" smtClean="0"/>
+              <a:t>：</a:t>
+            </a:r>
+            <a:endParaRPr lang="en-US" altLang="zh-CN" sz="3000" dirty="0" smtClean="0"/>
+          </a:p>
+          <a:p>
+            <a:pPr marL="285750" indent="-285750">
+              <a:buFont typeface="Arial" charset="0"/>
+              <a:buChar char="•"/>
+            </a:pPr>
+            <a:r>
+              <a:rPr lang="zh-CN" altLang="en-US" sz="3000" dirty="0" smtClean="0"/>
+              <a:t>语言检测</a:t>
+            </a:r>
+            <a:endParaRPr lang="en-US" altLang="zh-CN" sz="3000" dirty="0" smtClean="0"/>
+          </a:p>
+          <a:p>
+            <a:pPr marL="285750" indent="-285750">
+              <a:buFont typeface="Arial" charset="0"/>
+              <a:buChar char="•"/>
+            </a:pPr>
+            <a:r>
+              <a:rPr lang="zh-CN" altLang="en-US" sz="3000" dirty="0" smtClean="0"/>
+              <a:t>符号化识别</a:t>
+            </a:r>
+            <a:endParaRPr lang="en-US" altLang="zh-CN" sz="3000" dirty="0" smtClean="0"/>
+          </a:p>
+          <a:p>
+            <a:pPr marL="285750" indent="-285750">
+              <a:buFont typeface="Arial" charset="0"/>
+              <a:buChar char="•"/>
+            </a:pPr>
+            <a:r>
+              <a:rPr lang="zh-CN" altLang="en-US" sz="3000" dirty="0" smtClean="0"/>
+              <a:t>词形还原</a:t>
+            </a:r>
+            <a:endParaRPr lang="en-US" altLang="zh-CN" sz="3000" dirty="0" smtClean="0"/>
+          </a:p>
+          <a:p>
+            <a:pPr marL="285750" indent="-285750">
+              <a:buFont typeface="Arial" charset="0"/>
+              <a:buChar char="•"/>
+            </a:pPr>
+            <a:r>
+              <a:rPr lang="zh-CN" altLang="en-US" sz="3000" dirty="0" smtClean="0"/>
+              <a:t>对话分段</a:t>
+            </a:r>
+            <a:endParaRPr lang="en-US" altLang="zh-CN" sz="3000" dirty="0" smtClean="0"/>
+          </a:p>
+          <a:p>
+            <a:pPr marL="285750" indent="-285750">
+              <a:buFont typeface="Arial" charset="0"/>
+              <a:buChar char="•"/>
+            </a:pPr>
+            <a:r>
+              <a:rPr lang="zh-CN" altLang="en-US" sz="3000" dirty="0" smtClean="0"/>
+              <a:t>实体名称识别</a:t>
+            </a:r>
+            <a:endParaRPr lang="en-US" sz="3000" dirty="0"/>
+          </a:p>
+        </p:txBody>
+      </p:sp>
+      <p:sp>
+        <p:nvSpPr>
+          <p:cNvPr id="7" name="TextBox 6"/>
+          <p:cNvSpPr txBox="1"/>
+          <p:nvPr/>
+        </p:nvSpPr>
+        <p:spPr>
+          <a:xfrm>
             <a:off x="540000" y="540000"/>
-            <a:ext cx="3150093" cy="553998"/>
+            <a:ext cx="1723549" cy="553998"/>
           </a:xfrm>
           <a:prstGeom prst="rect">
             <a:avLst/>
@@ -4235,89 +4558,16 @@
               </a:rPr>
               <a:t>ML</a:t>
             </a:r>
-            <a:r>
-              <a:rPr lang="zh-CN" altLang="en-US" sz="3000" b="1" dirty="0" smtClean="0">
-                <a:latin typeface="Helvetica Bold" charset="0"/>
-              </a:rPr>
-              <a:t> </a:t>
-            </a:r>
-            <a:r>
-              <a:rPr lang="en-US" altLang="zh-CN" sz="3000" b="1" dirty="0" smtClean="0">
-                <a:latin typeface="Helvetica Bold" charset="0"/>
-              </a:rPr>
-              <a:t>Models</a:t>
-            </a:r>
             <a:endParaRPr lang="en-US" sz="3000" b="1" dirty="0">
               <a:latin typeface="Helvetica Bold" charset="0"/>
             </a:endParaRPr>
           </a:p>
         </p:txBody>
       </p:sp>
-      <p:pic>
-        <p:nvPicPr>
-          <p:cNvPr id="3" name="Picture 2"/>
-          <p:cNvPicPr>
-            <a:picLocks noChangeAspect="1"/>
-          </p:cNvPicPr>
-          <p:nvPr/>
-        </p:nvPicPr>
-        <p:blipFill>
-          <a:blip r:embed="rId2"/>
-          <a:stretch>
-            <a:fillRect/>
-          </a:stretch>
-        </p:blipFill>
-        <p:spPr>
-          <a:xfrm>
-            <a:off x="3553710" y="2497735"/>
-            <a:ext cx="5054600" cy="2971800"/>
-          </a:xfrm>
-          <a:prstGeom prst="rect">
-            <a:avLst/>
-          </a:prstGeom>
-        </p:spPr>
-      </p:pic>
-      <p:sp>
-        <p:nvSpPr>
-          <p:cNvPr id="4" name="TextBox 3"/>
-          <p:cNvSpPr txBox="1"/>
-          <p:nvPr/>
-        </p:nvSpPr>
-        <p:spPr>
-          <a:xfrm>
-            <a:off x="540000" y="1324071"/>
-            <a:ext cx="4698402" cy="369332"/>
-          </a:xfrm>
-          <a:prstGeom prst="rect">
-            <a:avLst/>
-          </a:prstGeom>
-          <a:noFill/>
-        </p:spPr>
-        <p:txBody>
-          <a:bodyPr wrap="none" rtlCol="0">
-            <a:spAutoFit/>
-          </a:bodyPr>
-          <a:lstStyle/>
-          <a:p>
-            <a:r>
-              <a:rPr lang="en-US" dirty="0"/>
-              <a:t>https://</a:t>
-            </a:r>
-            <a:r>
-              <a:rPr lang="en-US" dirty="0" err="1"/>
-              <a:t>developer.apple.com</a:t>
-            </a:r>
-            <a:r>
-              <a:rPr lang="en-US" dirty="0"/>
-              <a:t>/machine-learning/</a:t>
-            </a:r>
-          </a:p>
-        </p:txBody>
-      </p:sp>
     </p:spTree>
     <p:extLst>
       <p:ext uri="{BB962C8B-B14F-4D97-AF65-F5344CB8AC3E}">
-        <p14:creationId xmlns:p14="http://schemas.microsoft.com/office/powerpoint/2010/main" val="819567566"/>
+        <p14:creationId xmlns:p14="http://schemas.microsoft.com/office/powerpoint/2010/main" val="1531837236"/>
       </p:ext>
     </p:extLst>
   </p:cSld>
@@ -4411,7 +4661,7 @@
       </p:sp>
       <p:pic>
         <p:nvPicPr>
-          <p:cNvPr id="5" name="Picture 4"/>
+          <p:cNvPr id="3" name="Picture 2"/>
           <p:cNvPicPr>
             <a:picLocks noChangeAspect="1"/>
           </p:cNvPicPr>
@@ -4425,8 +4675,8 @@
         </p:blipFill>
         <p:spPr>
           <a:xfrm>
-            <a:off x="2700742" y="2017737"/>
-            <a:ext cx="6515100" cy="4381500"/>
+            <a:off x="3553710" y="2497735"/>
+            <a:ext cx="5054600" cy="2971800"/>
           </a:xfrm>
           <a:prstGeom prst="rect">
             <a:avLst/>
@@ -4435,14 +4685,14 @@
       </p:pic>
       <p:sp>
         <p:nvSpPr>
-          <p:cNvPr id="6" name="TextBox 5"/>
+          <p:cNvPr id="4" name="TextBox 3"/>
           <p:cNvSpPr txBox="1"/>
           <p:nvPr/>
         </p:nvSpPr>
         <p:spPr>
           <a:xfrm>
-            <a:off x="540000" y="1371201"/>
-            <a:ext cx="8995219" cy="369332"/>
+            <a:off x="540000" y="1324071"/>
+            <a:ext cx="4698402" cy="369332"/>
           </a:xfrm>
           <a:prstGeom prst="rect">
             <a:avLst/>
@@ -4465,28 +4715,15 @@
             </a:r>
             <a:r>
               <a:rPr lang="en-US" dirty="0"/>
-              <a:t>/documentation/</a:t>
-            </a:r>
-            <a:r>
-              <a:rPr lang="en-US" dirty="0" err="1"/>
-              <a:t>coreml</a:t>
-            </a:r>
-            <a:r>
-              <a:rPr lang="en-US" dirty="0"/>
-              <a:t>/</a:t>
-            </a:r>
-            <a:r>
-              <a:rPr lang="en-US" dirty="0" err="1"/>
-              <a:t>converting_trained_models_to_core_ml</a:t>
-            </a:r>
-            <a:endParaRPr lang="en-US" dirty="0"/>
+              <a:t>/machine-learning/</a:t>
+            </a:r>
           </a:p>
         </p:txBody>
       </p:sp>
     </p:spTree>
     <p:extLst>
       <p:ext uri="{BB962C8B-B14F-4D97-AF65-F5344CB8AC3E}">
-        <p14:creationId xmlns:p14="http://schemas.microsoft.com/office/powerpoint/2010/main" val="1379326212"/>
+        <p14:creationId xmlns:p14="http://schemas.microsoft.com/office/powerpoint/2010/main" val="819567566"/>
       </p:ext>
     </p:extLst>
   </p:cSld>
@@ -4520,10 +4757,988 @@
           <a:chExt cx="0" cy="0"/>
         </a:xfrm>
       </p:grpSpPr>
+      <p:sp>
+        <p:nvSpPr>
+          <p:cNvPr id="2" name="TextBox 1"/>
+          <p:cNvSpPr txBox="1"/>
+          <p:nvPr/>
+        </p:nvSpPr>
+        <p:spPr>
+          <a:xfrm>
+            <a:off x="540000" y="540000"/>
+            <a:ext cx="3150093" cy="553998"/>
+          </a:xfrm>
+          <a:prstGeom prst="rect">
+            <a:avLst/>
+          </a:prstGeom>
+          <a:noFill/>
+        </p:spPr>
+        <p:txBody>
+          <a:bodyPr wrap="none" rtlCol="0">
+            <a:spAutoFit/>
+          </a:bodyPr>
+          <a:lstStyle/>
+          <a:p>
+            <a:r>
+              <a:rPr lang="en-US" altLang="zh-CN" sz="3000" b="1" dirty="0" smtClean="0">
+                <a:latin typeface="Helvetica Bold" charset="0"/>
+              </a:rPr>
+              <a:t>Core</a:t>
+            </a:r>
+            <a:r>
+              <a:rPr lang="zh-CN" altLang="en-US" sz="3000" b="1" dirty="0" smtClean="0">
+                <a:latin typeface="Helvetica Bold" charset="0"/>
+              </a:rPr>
+              <a:t> </a:t>
+            </a:r>
+            <a:r>
+              <a:rPr lang="en-US" altLang="zh-CN" sz="3000" b="1" dirty="0" smtClean="0">
+                <a:latin typeface="Helvetica Bold" charset="0"/>
+              </a:rPr>
+              <a:t>ML</a:t>
+            </a:r>
+            <a:r>
+              <a:rPr lang="zh-CN" altLang="en-US" sz="3000" b="1" dirty="0" smtClean="0">
+                <a:latin typeface="Helvetica Bold" charset="0"/>
+              </a:rPr>
+              <a:t> </a:t>
+            </a:r>
+            <a:r>
+              <a:rPr lang="en-US" altLang="zh-CN" sz="3000" b="1" dirty="0" smtClean="0">
+                <a:latin typeface="Helvetica Bold" charset="0"/>
+              </a:rPr>
+              <a:t>Models</a:t>
+            </a:r>
+            <a:endParaRPr lang="en-US" sz="3000" b="1" dirty="0">
+              <a:latin typeface="Helvetica Bold" charset="0"/>
+            </a:endParaRPr>
+          </a:p>
+        </p:txBody>
+      </p:sp>
+      <p:pic>
+        <p:nvPicPr>
+          <p:cNvPr id="5" name="Picture 4"/>
+          <p:cNvPicPr>
+            <a:picLocks noChangeAspect="1"/>
+          </p:cNvPicPr>
+          <p:nvPr/>
+        </p:nvPicPr>
+        <p:blipFill>
+          <a:blip r:embed="rId2"/>
+          <a:stretch>
+            <a:fillRect/>
+          </a:stretch>
+        </p:blipFill>
+        <p:spPr>
+          <a:xfrm>
+            <a:off x="2700742" y="2017737"/>
+            <a:ext cx="6515100" cy="4381500"/>
+          </a:xfrm>
+          <a:prstGeom prst="rect">
+            <a:avLst/>
+          </a:prstGeom>
+        </p:spPr>
+      </p:pic>
+      <p:sp>
+        <p:nvSpPr>
+          <p:cNvPr id="6" name="TextBox 5"/>
+          <p:cNvSpPr txBox="1"/>
+          <p:nvPr/>
+        </p:nvSpPr>
+        <p:spPr>
+          <a:xfrm>
+            <a:off x="540000" y="1371201"/>
+            <a:ext cx="8995219" cy="369332"/>
+          </a:xfrm>
+          <a:prstGeom prst="rect">
+            <a:avLst/>
+          </a:prstGeom>
+          <a:noFill/>
+        </p:spPr>
+        <p:txBody>
+          <a:bodyPr wrap="none" rtlCol="0">
+            <a:spAutoFit/>
+          </a:bodyPr>
+          <a:lstStyle/>
+          <a:p>
+            <a:r>
+              <a:rPr lang="en-US" dirty="0"/>
+              <a:t>https://</a:t>
+            </a:r>
+            <a:r>
+              <a:rPr lang="en-US" dirty="0" err="1"/>
+              <a:t>developer.apple.com</a:t>
+            </a:r>
+            <a:r>
+              <a:rPr lang="en-US" dirty="0"/>
+              <a:t>/documentation/</a:t>
+            </a:r>
+            <a:r>
+              <a:rPr lang="en-US" dirty="0" err="1"/>
+              <a:t>coreml</a:t>
+            </a:r>
+            <a:r>
+              <a:rPr lang="en-US" dirty="0"/>
+              <a:t>/</a:t>
+            </a:r>
+            <a:r>
+              <a:rPr lang="en-US" dirty="0" err="1"/>
+              <a:t>converting_trained_models_to_core_ml</a:t>
+            </a:r>
+            <a:endParaRPr lang="en-US" dirty="0"/>
+          </a:p>
+        </p:txBody>
+      </p:sp>
     </p:spTree>
     <p:extLst>
       <p:ext uri="{BB962C8B-B14F-4D97-AF65-F5344CB8AC3E}">
-        <p14:creationId xmlns:p14="http://schemas.microsoft.com/office/powerpoint/2010/main" val="597260144"/>
+        <p14:creationId xmlns:p14="http://schemas.microsoft.com/office/powerpoint/2010/main" val="1379326212"/>
+      </p:ext>
+    </p:extLst>
+  </p:cSld>
+  <p:clrMapOvr>
+    <a:masterClrMapping/>
+  </p:clrMapOvr>
+  <p:timing>
+    <p:tnLst>
+      <p:par>
+        <p:cTn id="1" dur="indefinite" restart="never" nodeType="tmRoot"/>
+      </p:par>
+    </p:tnLst>
+  </p:timing>
+</p:sld>
+</file>
+
+<file path=ppt/slides/slide15.xml><?xml version="1.0" encoding="utf-8"?>
+<p:sld xmlns:a="http://schemas.openxmlformats.org/drawingml/2006/main" xmlns:r="http://schemas.openxmlformats.org/officeDocument/2006/relationships" xmlns:p="http://schemas.openxmlformats.org/presentationml/2006/main">
+  <p:cSld>
+    <p:spTree>
+      <p:nvGrpSpPr>
+        <p:cNvPr id="1" name=""/>
+        <p:cNvGrpSpPr/>
+        <p:nvPr/>
+      </p:nvGrpSpPr>
+      <p:grpSpPr>
+        <a:xfrm>
+          <a:off x="0" y="0"/>
+          <a:ext cx="0" cy="0"/>
+          <a:chOff x="0" y="0"/>
+          <a:chExt cx="0" cy="0"/>
+        </a:xfrm>
+      </p:grpSpPr>
+      <p:sp>
+        <p:nvSpPr>
+          <p:cNvPr id="2" name="TextBox 1"/>
+          <p:cNvSpPr txBox="1"/>
+          <p:nvPr/>
+        </p:nvSpPr>
+        <p:spPr>
+          <a:xfrm>
+            <a:off x="540000" y="540000"/>
+            <a:ext cx="2021707" cy="553998"/>
+          </a:xfrm>
+          <a:prstGeom prst="rect">
+            <a:avLst/>
+          </a:prstGeom>
+          <a:noFill/>
+        </p:spPr>
+        <p:txBody>
+          <a:bodyPr wrap="none" rtlCol="0">
+            <a:spAutoFit/>
+          </a:bodyPr>
+          <a:lstStyle/>
+          <a:p>
+            <a:r>
+              <a:rPr lang="en-US" altLang="zh-CN" sz="3000" b="1" dirty="0" smtClean="0">
+                <a:latin typeface="Helvetica Bold" charset="0"/>
+              </a:rPr>
+              <a:t>Demo</a:t>
+            </a:r>
+            <a:r>
+              <a:rPr lang="zh-CN" altLang="en-US" sz="3000" b="1" dirty="0" smtClean="0">
+                <a:latin typeface="Helvetica Bold" charset="0"/>
+              </a:rPr>
+              <a:t>说明</a:t>
+            </a:r>
+            <a:endParaRPr lang="en-US" altLang="zh-CN" sz="3000" b="1" dirty="0" smtClean="0">
+              <a:latin typeface="Helvetica Bold" charset="0"/>
+            </a:endParaRPr>
+          </a:p>
+        </p:txBody>
+      </p:sp>
+      <p:sp>
+        <p:nvSpPr>
+          <p:cNvPr id="4" name="TextBox 3"/>
+          <p:cNvSpPr txBox="1"/>
+          <p:nvPr/>
+        </p:nvSpPr>
+        <p:spPr>
+          <a:xfrm>
+            <a:off x="540000" y="1213658"/>
+            <a:ext cx="759888" cy="369332"/>
+          </a:xfrm>
+          <a:prstGeom prst="rect">
+            <a:avLst/>
+          </a:prstGeom>
+          <a:noFill/>
+        </p:spPr>
+        <p:txBody>
+          <a:bodyPr wrap="none" rtlCol="0">
+            <a:spAutoFit/>
+          </a:bodyPr>
+          <a:lstStyle/>
+          <a:p>
+            <a:r>
+              <a:rPr lang="en-US" altLang="zh-CN" dirty="0" err="1" smtClean="0"/>
+              <a:t>Xcode</a:t>
+            </a:r>
+            <a:endParaRPr lang="en-US" altLang="zh-CN" dirty="0" smtClean="0"/>
+          </a:p>
+        </p:txBody>
+      </p:sp>
+      <p:pic>
+        <p:nvPicPr>
+          <p:cNvPr id="9" name="Picture 8"/>
+          <p:cNvPicPr>
+            <a:picLocks noChangeAspect="1"/>
+          </p:cNvPicPr>
+          <p:nvPr/>
+        </p:nvPicPr>
+        <p:blipFill>
+          <a:blip r:embed="rId2"/>
+          <a:stretch>
+            <a:fillRect/>
+          </a:stretch>
+        </p:blipFill>
+        <p:spPr>
+          <a:xfrm>
+            <a:off x="1752899" y="1582990"/>
+            <a:ext cx="8686201" cy="4821538"/>
+          </a:xfrm>
+          <a:prstGeom prst="rect">
+            <a:avLst/>
+          </a:prstGeom>
+        </p:spPr>
+      </p:pic>
+    </p:spTree>
+    <p:extLst>
+      <p:ext uri="{BB962C8B-B14F-4D97-AF65-F5344CB8AC3E}">
+        <p14:creationId xmlns:p14="http://schemas.microsoft.com/office/powerpoint/2010/main" val="1416485987"/>
+      </p:ext>
+    </p:extLst>
+  </p:cSld>
+  <p:clrMapOvr>
+    <a:masterClrMapping/>
+  </p:clrMapOvr>
+  <p:timing>
+    <p:tnLst>
+      <p:par>
+        <p:cTn id="1" dur="indefinite" restart="never" nodeType="tmRoot"/>
+      </p:par>
+    </p:tnLst>
+  </p:timing>
+</p:sld>
+</file>
+
+<file path=ppt/slides/slide16.xml><?xml version="1.0" encoding="utf-8"?>
+<p:sld xmlns:a="http://schemas.openxmlformats.org/drawingml/2006/main" xmlns:r="http://schemas.openxmlformats.org/officeDocument/2006/relationships" xmlns:p="http://schemas.openxmlformats.org/presentationml/2006/main">
+  <p:cSld>
+    <p:spTree>
+      <p:nvGrpSpPr>
+        <p:cNvPr id="1" name=""/>
+        <p:cNvGrpSpPr/>
+        <p:nvPr/>
+      </p:nvGrpSpPr>
+      <p:grpSpPr>
+        <a:xfrm>
+          <a:off x="0" y="0"/>
+          <a:ext cx="0" cy="0"/>
+          <a:chOff x="0" y="0"/>
+          <a:chExt cx="0" cy="0"/>
+        </a:xfrm>
+      </p:grpSpPr>
+      <p:sp>
+        <p:nvSpPr>
+          <p:cNvPr id="2" name="TextBox 1"/>
+          <p:cNvSpPr txBox="1"/>
+          <p:nvPr/>
+        </p:nvSpPr>
+        <p:spPr>
+          <a:xfrm>
+            <a:off x="540000" y="540000"/>
+            <a:ext cx="2021707" cy="553998"/>
+          </a:xfrm>
+          <a:prstGeom prst="rect">
+            <a:avLst/>
+          </a:prstGeom>
+          <a:noFill/>
+        </p:spPr>
+        <p:txBody>
+          <a:bodyPr wrap="none" rtlCol="0">
+            <a:spAutoFit/>
+          </a:bodyPr>
+          <a:lstStyle/>
+          <a:p>
+            <a:r>
+              <a:rPr lang="en-US" altLang="zh-CN" sz="3000" b="1" dirty="0" smtClean="0">
+                <a:latin typeface="Helvetica Bold" charset="0"/>
+              </a:rPr>
+              <a:t>Demo</a:t>
+            </a:r>
+            <a:r>
+              <a:rPr lang="zh-CN" altLang="en-US" sz="3000" b="1" dirty="0" smtClean="0">
+                <a:latin typeface="Helvetica Bold" charset="0"/>
+              </a:rPr>
+              <a:t>说明</a:t>
+            </a:r>
+            <a:endParaRPr lang="en-US" altLang="zh-CN" sz="3000" b="1" dirty="0" smtClean="0">
+              <a:latin typeface="Helvetica Bold" charset="0"/>
+            </a:endParaRPr>
+          </a:p>
+        </p:txBody>
+      </p:sp>
+      <p:sp>
+        <p:nvSpPr>
+          <p:cNvPr id="4" name="TextBox 3"/>
+          <p:cNvSpPr txBox="1"/>
+          <p:nvPr/>
+        </p:nvSpPr>
+        <p:spPr>
+          <a:xfrm>
+            <a:off x="540000" y="1213658"/>
+            <a:ext cx="759888" cy="369332"/>
+          </a:xfrm>
+          <a:prstGeom prst="rect">
+            <a:avLst/>
+          </a:prstGeom>
+          <a:noFill/>
+        </p:spPr>
+        <p:txBody>
+          <a:bodyPr wrap="none" rtlCol="0">
+            <a:spAutoFit/>
+          </a:bodyPr>
+          <a:lstStyle/>
+          <a:p>
+            <a:r>
+              <a:rPr lang="en-US" altLang="zh-CN" dirty="0" err="1" smtClean="0"/>
+              <a:t>Xcode</a:t>
+            </a:r>
+            <a:endParaRPr lang="en-US" altLang="zh-CN" dirty="0" smtClean="0"/>
+          </a:p>
+        </p:txBody>
+      </p:sp>
+      <p:pic>
+        <p:nvPicPr>
+          <p:cNvPr id="9" name="Picture 8"/>
+          <p:cNvPicPr>
+            <a:picLocks noChangeAspect="1"/>
+          </p:cNvPicPr>
+          <p:nvPr/>
+        </p:nvPicPr>
+        <p:blipFill>
+          <a:blip r:embed="rId2"/>
+          <a:stretch>
+            <a:fillRect/>
+          </a:stretch>
+        </p:blipFill>
+        <p:spPr>
+          <a:xfrm>
+            <a:off x="1752899" y="1582990"/>
+            <a:ext cx="8686201" cy="4821538"/>
+          </a:xfrm>
+          <a:prstGeom prst="rect">
+            <a:avLst/>
+          </a:prstGeom>
+        </p:spPr>
+      </p:pic>
+      <p:sp>
+        <p:nvSpPr>
+          <p:cNvPr id="3" name="Rectangle 2"/>
+          <p:cNvSpPr/>
+          <p:nvPr/>
+        </p:nvSpPr>
+        <p:spPr>
+          <a:xfrm>
+            <a:off x="1752899" y="3521123"/>
+            <a:ext cx="8686201" cy="2883406"/>
+          </a:xfrm>
+          <a:prstGeom prst="rect">
+            <a:avLst/>
+          </a:prstGeom>
+          <a:solidFill>
+            <a:schemeClr val="bg1">
+              <a:alpha val="70000"/>
+            </a:schemeClr>
+          </a:solidFill>
+          <a:ln>
+            <a:noFill/>
+          </a:ln>
+        </p:spPr>
+        <p:style>
+          <a:lnRef idx="2">
+            <a:schemeClr val="accent1">
+              <a:shade val="50000"/>
+            </a:schemeClr>
+          </a:lnRef>
+          <a:fillRef idx="1">
+            <a:schemeClr val="accent1"/>
+          </a:fillRef>
+          <a:effectRef idx="0">
+            <a:schemeClr val="accent1"/>
+          </a:effectRef>
+          <a:fontRef idx="minor">
+            <a:schemeClr val="lt1"/>
+          </a:fontRef>
+        </p:style>
+        <p:txBody>
+          <a:bodyPr rtlCol="0" anchor="ctr"/>
+          <a:lstStyle/>
+          <a:p>
+            <a:pPr algn="ctr"/>
+            <a:endParaRPr lang="en-US"/>
+          </a:p>
+        </p:txBody>
+      </p:sp>
+    </p:spTree>
+    <p:extLst>
+      <p:ext uri="{BB962C8B-B14F-4D97-AF65-F5344CB8AC3E}">
+        <p14:creationId xmlns:p14="http://schemas.microsoft.com/office/powerpoint/2010/main" val="1777833112"/>
+      </p:ext>
+    </p:extLst>
+  </p:cSld>
+  <p:clrMapOvr>
+    <a:masterClrMapping/>
+  </p:clrMapOvr>
+  <p:timing>
+    <p:tnLst>
+      <p:par>
+        <p:cTn id="1" dur="indefinite" restart="never" nodeType="tmRoot"/>
+      </p:par>
+    </p:tnLst>
+  </p:timing>
+</p:sld>
+</file>
+
+<file path=ppt/slides/slide17.xml><?xml version="1.0" encoding="utf-8"?>
+<p:sld xmlns:a="http://schemas.openxmlformats.org/drawingml/2006/main" xmlns:r="http://schemas.openxmlformats.org/officeDocument/2006/relationships" xmlns:p="http://schemas.openxmlformats.org/presentationml/2006/main">
+  <p:cSld>
+    <p:spTree>
+      <p:nvGrpSpPr>
+        <p:cNvPr id="1" name=""/>
+        <p:cNvGrpSpPr/>
+        <p:nvPr/>
+      </p:nvGrpSpPr>
+      <p:grpSpPr>
+        <a:xfrm>
+          <a:off x="0" y="0"/>
+          <a:ext cx="0" cy="0"/>
+          <a:chOff x="0" y="0"/>
+          <a:chExt cx="0" cy="0"/>
+        </a:xfrm>
+      </p:grpSpPr>
+      <p:sp>
+        <p:nvSpPr>
+          <p:cNvPr id="2" name="TextBox 1"/>
+          <p:cNvSpPr txBox="1"/>
+          <p:nvPr/>
+        </p:nvSpPr>
+        <p:spPr>
+          <a:xfrm>
+            <a:off x="540000" y="540000"/>
+            <a:ext cx="2021707" cy="553998"/>
+          </a:xfrm>
+          <a:prstGeom prst="rect">
+            <a:avLst/>
+          </a:prstGeom>
+          <a:noFill/>
+        </p:spPr>
+        <p:txBody>
+          <a:bodyPr wrap="none" rtlCol="0">
+            <a:spAutoFit/>
+          </a:bodyPr>
+          <a:lstStyle/>
+          <a:p>
+            <a:r>
+              <a:rPr lang="en-US" altLang="zh-CN" sz="3000" b="1" dirty="0" smtClean="0">
+                <a:latin typeface="Helvetica Bold" charset="0"/>
+              </a:rPr>
+              <a:t>Demo</a:t>
+            </a:r>
+            <a:r>
+              <a:rPr lang="zh-CN" altLang="en-US" sz="3000" b="1" dirty="0" smtClean="0">
+                <a:latin typeface="Helvetica Bold" charset="0"/>
+              </a:rPr>
+              <a:t>说明</a:t>
+            </a:r>
+            <a:endParaRPr lang="en-US" altLang="zh-CN" sz="3000" b="1" dirty="0" smtClean="0">
+              <a:latin typeface="Helvetica Bold" charset="0"/>
+            </a:endParaRPr>
+          </a:p>
+        </p:txBody>
+      </p:sp>
+      <p:sp>
+        <p:nvSpPr>
+          <p:cNvPr id="4" name="TextBox 3"/>
+          <p:cNvSpPr txBox="1"/>
+          <p:nvPr/>
+        </p:nvSpPr>
+        <p:spPr>
+          <a:xfrm>
+            <a:off x="540000" y="1213658"/>
+            <a:ext cx="759888" cy="369332"/>
+          </a:xfrm>
+          <a:prstGeom prst="rect">
+            <a:avLst/>
+          </a:prstGeom>
+          <a:noFill/>
+        </p:spPr>
+        <p:txBody>
+          <a:bodyPr wrap="none" rtlCol="0">
+            <a:spAutoFit/>
+          </a:bodyPr>
+          <a:lstStyle/>
+          <a:p>
+            <a:r>
+              <a:rPr lang="en-US" altLang="zh-CN" dirty="0" err="1" smtClean="0"/>
+              <a:t>Xcode</a:t>
+            </a:r>
+            <a:endParaRPr lang="en-US" altLang="zh-CN" dirty="0" smtClean="0"/>
+          </a:p>
+        </p:txBody>
+      </p:sp>
+      <p:pic>
+        <p:nvPicPr>
+          <p:cNvPr id="9" name="Picture 8"/>
+          <p:cNvPicPr>
+            <a:picLocks noChangeAspect="1"/>
+          </p:cNvPicPr>
+          <p:nvPr/>
+        </p:nvPicPr>
+        <p:blipFill>
+          <a:blip r:embed="rId2"/>
+          <a:stretch>
+            <a:fillRect/>
+          </a:stretch>
+        </p:blipFill>
+        <p:spPr>
+          <a:xfrm>
+            <a:off x="1752899" y="1582990"/>
+            <a:ext cx="8686201" cy="4821538"/>
+          </a:xfrm>
+          <a:prstGeom prst="rect">
+            <a:avLst/>
+          </a:prstGeom>
+        </p:spPr>
+      </p:pic>
+      <p:sp>
+        <p:nvSpPr>
+          <p:cNvPr id="3" name="Rectangle 2"/>
+          <p:cNvSpPr/>
+          <p:nvPr/>
+        </p:nvSpPr>
+        <p:spPr>
+          <a:xfrm>
+            <a:off x="1752899" y="1582990"/>
+            <a:ext cx="8686201" cy="2934419"/>
+          </a:xfrm>
+          <a:prstGeom prst="rect">
+            <a:avLst/>
+          </a:prstGeom>
+          <a:solidFill>
+            <a:schemeClr val="bg1">
+              <a:alpha val="70000"/>
+            </a:schemeClr>
+          </a:solidFill>
+          <a:ln>
+            <a:noFill/>
+          </a:ln>
+        </p:spPr>
+        <p:style>
+          <a:lnRef idx="2">
+            <a:schemeClr val="accent1">
+              <a:shade val="50000"/>
+            </a:schemeClr>
+          </a:lnRef>
+          <a:fillRef idx="1">
+            <a:schemeClr val="accent1"/>
+          </a:fillRef>
+          <a:effectRef idx="0">
+            <a:schemeClr val="accent1"/>
+          </a:effectRef>
+          <a:fontRef idx="minor">
+            <a:schemeClr val="lt1"/>
+          </a:fontRef>
+        </p:style>
+        <p:txBody>
+          <a:bodyPr rtlCol="0" anchor="ctr"/>
+          <a:lstStyle/>
+          <a:p>
+            <a:pPr algn="ctr"/>
+            <a:endParaRPr lang="en-US"/>
+          </a:p>
+        </p:txBody>
+      </p:sp>
+    </p:spTree>
+    <p:extLst>
+      <p:ext uri="{BB962C8B-B14F-4D97-AF65-F5344CB8AC3E}">
+        <p14:creationId xmlns:p14="http://schemas.microsoft.com/office/powerpoint/2010/main" val="1417596115"/>
+      </p:ext>
+    </p:extLst>
+  </p:cSld>
+  <p:clrMapOvr>
+    <a:masterClrMapping/>
+  </p:clrMapOvr>
+  <p:timing>
+    <p:tnLst>
+      <p:par>
+        <p:cTn id="1" dur="indefinite" restart="never" nodeType="tmRoot"/>
+      </p:par>
+    </p:tnLst>
+  </p:timing>
+</p:sld>
+</file>
+
+<file path=ppt/slides/slide18.xml><?xml version="1.0" encoding="utf-8"?>
+<p:sld xmlns:a="http://schemas.openxmlformats.org/drawingml/2006/main" xmlns:r="http://schemas.openxmlformats.org/officeDocument/2006/relationships" xmlns:p="http://schemas.openxmlformats.org/presentationml/2006/main">
+  <p:cSld>
+    <p:spTree>
+      <p:nvGrpSpPr>
+        <p:cNvPr id="1" name=""/>
+        <p:cNvGrpSpPr/>
+        <p:nvPr/>
+      </p:nvGrpSpPr>
+      <p:grpSpPr>
+        <a:xfrm>
+          <a:off x="0" y="0"/>
+          <a:ext cx="0" cy="0"/>
+          <a:chOff x="0" y="0"/>
+          <a:chExt cx="0" cy="0"/>
+        </a:xfrm>
+      </p:grpSpPr>
+      <p:sp>
+        <p:nvSpPr>
+          <p:cNvPr id="2" name="TextBox 1"/>
+          <p:cNvSpPr txBox="1"/>
+          <p:nvPr/>
+        </p:nvSpPr>
+        <p:spPr>
+          <a:xfrm>
+            <a:off x="540000" y="540000"/>
+            <a:ext cx="2021707" cy="553998"/>
+          </a:xfrm>
+          <a:prstGeom prst="rect">
+            <a:avLst/>
+          </a:prstGeom>
+          <a:noFill/>
+        </p:spPr>
+        <p:txBody>
+          <a:bodyPr wrap="none" rtlCol="0">
+            <a:spAutoFit/>
+          </a:bodyPr>
+          <a:lstStyle/>
+          <a:p>
+            <a:r>
+              <a:rPr lang="en-US" altLang="zh-CN" sz="3000" b="1" dirty="0" smtClean="0">
+                <a:latin typeface="Helvetica Bold" charset="0"/>
+              </a:rPr>
+              <a:t>Demo</a:t>
+            </a:r>
+            <a:r>
+              <a:rPr lang="zh-CN" altLang="en-US" sz="3000" b="1" dirty="0" smtClean="0">
+                <a:latin typeface="Helvetica Bold" charset="0"/>
+              </a:rPr>
+              <a:t>说明</a:t>
+            </a:r>
+            <a:endParaRPr lang="en-US" altLang="zh-CN" sz="3000" b="1" dirty="0" smtClean="0">
+              <a:latin typeface="Helvetica Bold" charset="0"/>
+            </a:endParaRPr>
+          </a:p>
+        </p:txBody>
+      </p:sp>
+      <p:sp>
+        <p:nvSpPr>
+          <p:cNvPr id="4" name="TextBox 3"/>
+          <p:cNvSpPr txBox="1"/>
+          <p:nvPr/>
+        </p:nvSpPr>
+        <p:spPr>
+          <a:xfrm>
+            <a:off x="540000" y="1213658"/>
+            <a:ext cx="759888" cy="369332"/>
+          </a:xfrm>
+          <a:prstGeom prst="rect">
+            <a:avLst/>
+          </a:prstGeom>
+          <a:noFill/>
+        </p:spPr>
+        <p:txBody>
+          <a:bodyPr wrap="none" rtlCol="0">
+            <a:spAutoFit/>
+          </a:bodyPr>
+          <a:lstStyle/>
+          <a:p>
+            <a:r>
+              <a:rPr lang="en-US" altLang="zh-CN" dirty="0" err="1" smtClean="0"/>
+              <a:t>Xcode</a:t>
+            </a:r>
+            <a:endParaRPr lang="en-US" altLang="zh-CN" dirty="0" smtClean="0"/>
+          </a:p>
+        </p:txBody>
+      </p:sp>
+      <p:pic>
+        <p:nvPicPr>
+          <p:cNvPr id="9" name="Picture 8"/>
+          <p:cNvPicPr>
+            <a:picLocks noChangeAspect="1"/>
+          </p:cNvPicPr>
+          <p:nvPr/>
+        </p:nvPicPr>
+        <p:blipFill>
+          <a:blip r:embed="rId2"/>
+          <a:stretch>
+            <a:fillRect/>
+          </a:stretch>
+        </p:blipFill>
+        <p:spPr>
+          <a:xfrm>
+            <a:off x="1752899" y="1582990"/>
+            <a:ext cx="8686201" cy="4821538"/>
+          </a:xfrm>
+          <a:prstGeom prst="rect">
+            <a:avLst/>
+          </a:prstGeom>
+        </p:spPr>
+      </p:pic>
+      <p:sp>
+        <p:nvSpPr>
+          <p:cNvPr id="3" name="Rectangle 2"/>
+          <p:cNvSpPr/>
+          <p:nvPr/>
+        </p:nvSpPr>
+        <p:spPr>
+          <a:xfrm>
+            <a:off x="1752899" y="1582991"/>
+            <a:ext cx="8686201" cy="1938132"/>
+          </a:xfrm>
+          <a:prstGeom prst="rect">
+            <a:avLst/>
+          </a:prstGeom>
+          <a:solidFill>
+            <a:schemeClr val="bg1">
+              <a:alpha val="70000"/>
+            </a:schemeClr>
+          </a:solidFill>
+          <a:ln>
+            <a:noFill/>
+          </a:ln>
+        </p:spPr>
+        <p:style>
+          <a:lnRef idx="2">
+            <a:schemeClr val="accent1">
+              <a:shade val="50000"/>
+            </a:schemeClr>
+          </a:lnRef>
+          <a:fillRef idx="1">
+            <a:schemeClr val="accent1"/>
+          </a:fillRef>
+          <a:effectRef idx="0">
+            <a:schemeClr val="accent1"/>
+          </a:effectRef>
+          <a:fontRef idx="minor">
+            <a:schemeClr val="lt1"/>
+          </a:fontRef>
+        </p:style>
+        <p:txBody>
+          <a:bodyPr rtlCol="0" anchor="ctr"/>
+          <a:lstStyle/>
+          <a:p>
+            <a:pPr algn="ctr"/>
+            <a:endParaRPr lang="en-US"/>
+          </a:p>
+        </p:txBody>
+      </p:sp>
+      <p:sp>
+        <p:nvSpPr>
+          <p:cNvPr id="6" name="Rectangle 5"/>
+          <p:cNvSpPr/>
+          <p:nvPr/>
+        </p:nvSpPr>
+        <p:spPr>
+          <a:xfrm>
+            <a:off x="1752898" y="4503761"/>
+            <a:ext cx="8686201" cy="1900768"/>
+          </a:xfrm>
+          <a:prstGeom prst="rect">
+            <a:avLst/>
+          </a:prstGeom>
+          <a:solidFill>
+            <a:schemeClr val="bg1">
+              <a:alpha val="70000"/>
+            </a:schemeClr>
+          </a:solidFill>
+          <a:ln>
+            <a:noFill/>
+          </a:ln>
+        </p:spPr>
+        <p:style>
+          <a:lnRef idx="2">
+            <a:schemeClr val="accent1">
+              <a:shade val="50000"/>
+            </a:schemeClr>
+          </a:lnRef>
+          <a:fillRef idx="1">
+            <a:schemeClr val="accent1"/>
+          </a:fillRef>
+          <a:effectRef idx="0">
+            <a:schemeClr val="accent1"/>
+          </a:effectRef>
+          <a:fontRef idx="minor">
+            <a:schemeClr val="lt1"/>
+          </a:fontRef>
+        </p:style>
+        <p:txBody>
+          <a:bodyPr rtlCol="0" anchor="ctr"/>
+          <a:lstStyle/>
+          <a:p>
+            <a:pPr algn="ctr"/>
+            <a:endParaRPr lang="en-US"/>
+          </a:p>
+        </p:txBody>
+      </p:sp>
+    </p:spTree>
+    <p:extLst>
+      <p:ext uri="{BB962C8B-B14F-4D97-AF65-F5344CB8AC3E}">
+        <p14:creationId xmlns:p14="http://schemas.microsoft.com/office/powerpoint/2010/main" val="1354324987"/>
+      </p:ext>
+    </p:extLst>
+  </p:cSld>
+  <p:clrMapOvr>
+    <a:masterClrMapping/>
+  </p:clrMapOvr>
+  <p:timing>
+    <p:tnLst>
+      <p:par>
+        <p:cTn id="1" dur="indefinite" restart="never" nodeType="tmRoot"/>
+      </p:par>
+    </p:tnLst>
+  </p:timing>
+</p:sld>
+</file>
+
+<file path=ppt/slides/slide19.xml><?xml version="1.0" encoding="utf-8"?>
+<p:sld xmlns:a="http://schemas.openxmlformats.org/drawingml/2006/main" xmlns:r="http://schemas.openxmlformats.org/officeDocument/2006/relationships" xmlns:p="http://schemas.openxmlformats.org/presentationml/2006/main">
+  <p:cSld>
+    <p:spTree>
+      <p:nvGrpSpPr>
+        <p:cNvPr id="1" name=""/>
+        <p:cNvGrpSpPr/>
+        <p:nvPr/>
+      </p:nvGrpSpPr>
+      <p:grpSpPr>
+        <a:xfrm>
+          <a:off x="0" y="0"/>
+          <a:ext cx="0" cy="0"/>
+          <a:chOff x="0" y="0"/>
+          <a:chExt cx="0" cy="0"/>
+        </a:xfrm>
+      </p:grpSpPr>
+      <p:sp>
+        <p:nvSpPr>
+          <p:cNvPr id="2" name="TextBox 1"/>
+          <p:cNvSpPr txBox="1"/>
+          <p:nvPr/>
+        </p:nvSpPr>
+        <p:spPr>
+          <a:xfrm>
+            <a:off x="540000" y="540000"/>
+            <a:ext cx="2021707" cy="553998"/>
+          </a:xfrm>
+          <a:prstGeom prst="rect">
+            <a:avLst/>
+          </a:prstGeom>
+          <a:noFill/>
+        </p:spPr>
+        <p:txBody>
+          <a:bodyPr wrap="none" rtlCol="0">
+            <a:spAutoFit/>
+          </a:bodyPr>
+          <a:lstStyle/>
+          <a:p>
+            <a:r>
+              <a:rPr lang="en-US" altLang="zh-CN" sz="3000" b="1" dirty="0" smtClean="0">
+                <a:latin typeface="Helvetica Bold" charset="0"/>
+              </a:rPr>
+              <a:t>Demo</a:t>
+            </a:r>
+            <a:r>
+              <a:rPr lang="zh-CN" altLang="en-US" sz="3000" b="1" dirty="0" smtClean="0">
+                <a:latin typeface="Helvetica Bold" charset="0"/>
+              </a:rPr>
+              <a:t>说明</a:t>
+            </a:r>
+            <a:endParaRPr lang="en-US" altLang="zh-CN" sz="3000" b="1" dirty="0" smtClean="0">
+              <a:latin typeface="Helvetica Bold" charset="0"/>
+            </a:endParaRPr>
+          </a:p>
+        </p:txBody>
+      </p:sp>
+      <p:sp>
+        <p:nvSpPr>
+          <p:cNvPr id="4" name="TextBox 3"/>
+          <p:cNvSpPr txBox="1"/>
+          <p:nvPr/>
+        </p:nvSpPr>
+        <p:spPr>
+          <a:xfrm>
+            <a:off x="540000" y="1213658"/>
+            <a:ext cx="755079" cy="369332"/>
+          </a:xfrm>
+          <a:prstGeom prst="rect">
+            <a:avLst/>
+          </a:prstGeom>
+          <a:noFill/>
+        </p:spPr>
+        <p:txBody>
+          <a:bodyPr wrap="none" rtlCol="0">
+            <a:spAutoFit/>
+          </a:bodyPr>
+          <a:lstStyle/>
+          <a:p>
+            <a:r>
+              <a:rPr lang="en-US" altLang="zh-CN" dirty="0" smtClean="0"/>
+              <a:t>Usage</a:t>
+            </a:r>
+          </a:p>
+        </p:txBody>
+      </p:sp>
+      <p:pic>
+        <p:nvPicPr>
+          <p:cNvPr id="9" name="Picture 8"/>
+          <p:cNvPicPr>
+            <a:picLocks noChangeAspect="1"/>
+          </p:cNvPicPr>
+          <p:nvPr/>
+        </p:nvPicPr>
+        <p:blipFill>
+          <a:blip r:embed="rId2"/>
+          <a:stretch>
+            <a:fillRect/>
+          </a:stretch>
+        </p:blipFill>
+        <p:spPr>
+          <a:xfrm>
+            <a:off x="218049" y="2089997"/>
+            <a:ext cx="11755902" cy="2786899"/>
+          </a:xfrm>
+          <a:prstGeom prst="rect">
+            <a:avLst/>
+          </a:prstGeom>
+        </p:spPr>
+      </p:pic>
+    </p:spTree>
+    <p:extLst>
+      <p:ext uri="{BB962C8B-B14F-4D97-AF65-F5344CB8AC3E}">
+        <p14:creationId xmlns:p14="http://schemas.microsoft.com/office/powerpoint/2010/main" val="839354057"/>
       </p:ext>
     </p:extLst>
   </p:cSld>
@@ -4925,6 +6140,136 @@
     <p:extLst>
       <p:ext uri="{BB962C8B-B14F-4D97-AF65-F5344CB8AC3E}">
         <p14:creationId xmlns:p14="http://schemas.microsoft.com/office/powerpoint/2010/main" val="2101582776"/>
+      </p:ext>
+    </p:extLst>
+  </p:cSld>
+  <p:clrMapOvr>
+    <a:masterClrMapping/>
+  </p:clrMapOvr>
+  <p:timing>
+    <p:tnLst>
+      <p:par>
+        <p:cTn id="1" dur="indefinite" restart="never" nodeType="tmRoot"/>
+      </p:par>
+    </p:tnLst>
+  </p:timing>
+</p:sld>
+</file>
+
+<file path=ppt/slides/slide20.xml><?xml version="1.0" encoding="utf-8"?>
+<p:sld xmlns:a="http://schemas.openxmlformats.org/drawingml/2006/main" xmlns:r="http://schemas.openxmlformats.org/officeDocument/2006/relationships" xmlns:p="http://schemas.openxmlformats.org/presentationml/2006/main">
+  <p:cSld>
+    <p:spTree>
+      <p:nvGrpSpPr>
+        <p:cNvPr id="1" name=""/>
+        <p:cNvGrpSpPr/>
+        <p:nvPr/>
+      </p:nvGrpSpPr>
+      <p:grpSpPr>
+        <a:xfrm>
+          <a:off x="0" y="0"/>
+          <a:ext cx="0" cy="0"/>
+          <a:chOff x="0" y="0"/>
+          <a:chExt cx="0" cy="0"/>
+        </a:xfrm>
+      </p:grpSpPr>
+      <p:sp>
+        <p:nvSpPr>
+          <p:cNvPr id="2" name="TextBox 1"/>
+          <p:cNvSpPr txBox="1"/>
+          <p:nvPr/>
+        </p:nvSpPr>
+        <p:spPr>
+          <a:xfrm>
+            <a:off x="540000" y="540000"/>
+            <a:ext cx="2021707" cy="553998"/>
+          </a:xfrm>
+          <a:prstGeom prst="rect">
+            <a:avLst/>
+          </a:prstGeom>
+          <a:noFill/>
+        </p:spPr>
+        <p:txBody>
+          <a:bodyPr wrap="none" rtlCol="0">
+            <a:spAutoFit/>
+          </a:bodyPr>
+          <a:lstStyle/>
+          <a:p>
+            <a:r>
+              <a:rPr lang="en-US" altLang="zh-CN" sz="3000" b="1" dirty="0" smtClean="0">
+                <a:latin typeface="Helvetica Bold" charset="0"/>
+              </a:rPr>
+              <a:t>Demo</a:t>
+            </a:r>
+            <a:r>
+              <a:rPr lang="zh-CN" altLang="en-US" sz="3000" b="1" dirty="0" smtClean="0">
+                <a:latin typeface="Helvetica Bold" charset="0"/>
+              </a:rPr>
+              <a:t>说明</a:t>
+            </a:r>
+            <a:endParaRPr lang="en-US" altLang="zh-CN" sz="3000" b="1" dirty="0" smtClean="0">
+              <a:latin typeface="Helvetica Bold" charset="0"/>
+            </a:endParaRPr>
+          </a:p>
+        </p:txBody>
+      </p:sp>
+      <p:sp>
+        <p:nvSpPr>
+          <p:cNvPr id="4" name="TextBox 3"/>
+          <p:cNvSpPr txBox="1"/>
+          <p:nvPr/>
+        </p:nvSpPr>
+        <p:spPr>
+          <a:xfrm>
+            <a:off x="540000" y="1213658"/>
+            <a:ext cx="755079" cy="369332"/>
+          </a:xfrm>
+          <a:prstGeom prst="rect">
+            <a:avLst/>
+          </a:prstGeom>
+          <a:noFill/>
+        </p:spPr>
+        <p:txBody>
+          <a:bodyPr wrap="none" rtlCol="0">
+            <a:spAutoFit/>
+          </a:bodyPr>
+          <a:lstStyle/>
+          <a:p>
+            <a:r>
+              <a:rPr lang="en-US" altLang="zh-CN" dirty="0" smtClean="0"/>
+              <a:t>Usage</a:t>
+            </a:r>
+          </a:p>
+        </p:txBody>
+      </p:sp>
+      <p:pic>
+        <p:nvPicPr>
+          <p:cNvPr id="9" name="Picture 8"/>
+          <p:cNvPicPr>
+            <a:picLocks noChangeAspect="1"/>
+          </p:cNvPicPr>
+          <p:nvPr/>
+        </p:nvPicPr>
+        <p:blipFill>
+          <a:blip r:embed="rId2"/>
+          <a:stretch>
+            <a:fillRect/>
+          </a:stretch>
+        </p:blipFill>
+        <p:spPr>
+          <a:xfrm>
+            <a:off x="218049" y="2089997"/>
+            <a:ext cx="11755902" cy="2786899"/>
+          </a:xfrm>
+          <a:prstGeom prst="rect">
+            <a:avLst/>
+          </a:prstGeom>
+        </p:spPr>
+      </p:pic>
+    </p:spTree>
+    <p:extLst>
+      <p:ext uri="{BB962C8B-B14F-4D97-AF65-F5344CB8AC3E}">
+        <p14:creationId xmlns:p14="http://schemas.microsoft.com/office/powerpoint/2010/main" val="1296627523"/>
       </p:ext>
     </p:extLst>
   </p:cSld>

</xml_diff>